<commit_message>
Agregando el framework de ayuda para el examen final parte 1
</commit_message>
<xml_diff>
--- a/CARTEL_PRONOSTICOS_Modelos_de_pronostico_aplicados_a_ademanda_De_gas_natural_v3.1.pptx
+++ b/CARTEL_PRONOSTICOS_Modelos_de_pronostico_aplicados_a_ademanda_De_gas_natural_v3.1.pptx
@@ -285,10 +285,183 @@
       </p15:sldGuideLst>
     </p:ext>
     <p:ext uri="http://customooxmlschemas.google.com/">
-      <go:slidesCustomData xmlns:go="http://customooxmlschemas.google.com/" xmlns:ahyp="http://schemas.microsoft.com/office/drawing/2018/hyperlinkcolor" xmlns:p15="http://schemas.microsoft.com/office/powerpoint/2012/main" xmlns:p14="http://schemas.microsoft.com/office/powerpoint/2010/main" xmlns:com="http://schemas.openxmlformats.org/drawingml/2006/compatibility" xmlns:pvml="urn:schemas-microsoft-com:office:powerpoint" xmlns:v="urn:schemas-microsoft-com:vml" xmlns:o="urn:schemas-microsoft-com:office:office" xmlns:dgm="http://schemas.openxmlformats.org/drawingml/2006/diagram" xmlns:c="http://schemas.openxmlformats.org/drawingml/2006/chart" xmlns:mv="urn:schemas-microsoft-com:mac:vml" xmlns:mc="http://schemas.openxmlformats.org/markup-compatibility/2006" xmlns="" r:id="rId16" roundtripDataSignature="AMtx7miQDVQXGM3vnSjUw7xkqrap4wCZRg=="/>
+      <go:slidesCustomData xmlns="" xmlns:mc="http://schemas.openxmlformats.org/markup-compatibility/2006" xmlns:mv="urn:schemas-microsoft-com:mac:vml" xmlns:c="http://schemas.openxmlformats.org/drawingml/2006/chart" xmlns:dgm="http://schemas.openxmlformats.org/drawingml/2006/diagram" xmlns:o="urn:schemas-microsoft-com:office:office" xmlns:v="urn:schemas-microsoft-com:vml" xmlns:pvml="urn:schemas-microsoft-com:office:powerpoint" xmlns:com="http://schemas.openxmlformats.org/drawingml/2006/compatibility" xmlns:p14="http://schemas.microsoft.com/office/powerpoint/2010/main" xmlns:p15="http://schemas.microsoft.com/office/powerpoint/2012/main" xmlns:ahyp="http://schemas.microsoft.com/office/drawing/2018/hyperlinkcolor" xmlns:go="http://customooxmlschemas.google.com/" r:id="rId16" roundtripDataSignature="AMtx7miQDVQXGM3vnSjUw7xkqrap4wCZRg=="/>
     </p:ext>
   </p:extLst>
 </p:presentation>
+</file>
+
+<file path=ppt/revisionInfo.xml><?xml version="1.0" encoding="utf-8"?>
+<p1510:revInfo xmlns:a="http://schemas.openxmlformats.org/drawingml/2006/main" xmlns:r="http://schemas.openxmlformats.org/officeDocument/2006/relationships" xmlns:p1510="http://schemas.microsoft.com/office/powerpoint/2015/10/main">
+  <p1510:revLst>
+    <p1510:client id="{7EABF997-40C1-4229-B033-0C29FF3C3FDD}" v="1" dt="2023-05-30T15:53:07.546"/>
+  </p1510:revLst>
+</p1510:revInfo>
+</file>
+
+<file path=ppt/changesInfos/changesInfo1.xml><?xml version="1.0" encoding="utf-8"?>
+<pc:chgInfo xmlns:a="http://schemas.openxmlformats.org/drawingml/2006/main" xmlns:r="http://schemas.openxmlformats.org/officeDocument/2006/relationships" xmlns:ac="http://schemas.microsoft.com/office/drawing/2013/main/command" xmlns:pc="http://schemas.microsoft.com/office/powerpoint/2013/main/command">
+  <pc:docChgLst>
+    <pc:chgData name="Sergio Ibarra" userId="f9e6e0322c927b48" providerId="LiveId" clId="{7EABF997-40C1-4229-B033-0C29FF3C3FDD}"/>
+    <pc:docChg chg="custSel modSld">
+      <pc:chgData name="Sergio Ibarra" userId="f9e6e0322c927b48" providerId="LiveId" clId="{7EABF997-40C1-4229-B033-0C29FF3C3FDD}" dt="2023-05-30T15:53:58.888" v="7"/>
+      <pc:docMkLst>
+        <pc:docMk/>
+      </pc:docMkLst>
+      <pc:sldChg chg="addSp delSp modSp mod">
+        <pc:chgData name="Sergio Ibarra" userId="f9e6e0322c927b48" providerId="LiveId" clId="{7EABF997-40C1-4229-B033-0C29FF3C3FDD}" dt="2023-05-30T15:53:58.888" v="7"/>
+        <pc:sldMkLst>
+          <pc:docMk/>
+          <pc:sldMk cId="2665960598" sldId="261"/>
+        </pc:sldMkLst>
+        <pc:spChg chg="del">
+          <ac:chgData name="Sergio Ibarra" userId="f9e6e0322c927b48" providerId="LiveId" clId="{7EABF997-40C1-4229-B033-0C29FF3C3FDD}" dt="2023-05-30T15:53:06.625" v="0" actId="478"/>
+          <ac:spMkLst>
+            <pc:docMk/>
+            <pc:sldMk cId="2665960598" sldId="261"/>
+            <ac:spMk id="2" creationId="{290B10F5-34AB-9F35-3B00-09E9158E64E0}"/>
+          </ac:spMkLst>
+        </pc:spChg>
+        <pc:spChg chg="del">
+          <ac:chgData name="Sergio Ibarra" userId="f9e6e0322c927b48" providerId="LiveId" clId="{7EABF997-40C1-4229-B033-0C29FF3C3FDD}" dt="2023-05-30T15:53:06.625" v="0" actId="478"/>
+          <ac:spMkLst>
+            <pc:docMk/>
+            <pc:sldMk cId="2665960598" sldId="261"/>
+            <ac:spMk id="4" creationId="{A03C1D89-0E0E-5B2B-11E3-9F0758203DB2}"/>
+          </ac:spMkLst>
+        </pc:spChg>
+        <pc:spChg chg="del">
+          <ac:chgData name="Sergio Ibarra" userId="f9e6e0322c927b48" providerId="LiveId" clId="{7EABF997-40C1-4229-B033-0C29FF3C3FDD}" dt="2023-05-30T15:53:06.625" v="0" actId="478"/>
+          <ac:spMkLst>
+            <pc:docMk/>
+            <pc:sldMk cId="2665960598" sldId="261"/>
+            <ac:spMk id="7" creationId="{D710EB25-DDE1-53D5-9BFB-95579D8E7A2D}"/>
+          </ac:spMkLst>
+        </pc:spChg>
+        <pc:spChg chg="mod">
+          <ac:chgData name="Sergio Ibarra" userId="f9e6e0322c927b48" providerId="LiveId" clId="{7EABF997-40C1-4229-B033-0C29FF3C3FDD}" dt="2023-05-30T15:53:46.796" v="5" actId="207"/>
+          <ac:spMkLst>
+            <pc:docMk/>
+            <pc:sldMk cId="2665960598" sldId="261"/>
+            <ac:spMk id="8" creationId="{45C2BDA2-0084-3429-5821-EAE0BE86367F}"/>
+          </ac:spMkLst>
+        </pc:spChg>
+        <pc:spChg chg="del">
+          <ac:chgData name="Sergio Ibarra" userId="f9e6e0322c927b48" providerId="LiveId" clId="{7EABF997-40C1-4229-B033-0C29FF3C3FDD}" dt="2023-05-30T15:53:06.625" v="0" actId="478"/>
+          <ac:spMkLst>
+            <pc:docMk/>
+            <pc:sldMk cId="2665960598" sldId="261"/>
+            <ac:spMk id="11" creationId="{8C5FBCAC-6DAD-DC5E-D5CD-0AD0CC02BAA7}"/>
+          </ac:spMkLst>
+        </pc:spChg>
+        <pc:spChg chg="del">
+          <ac:chgData name="Sergio Ibarra" userId="f9e6e0322c927b48" providerId="LiveId" clId="{7EABF997-40C1-4229-B033-0C29FF3C3FDD}" dt="2023-05-30T15:53:06.625" v="0" actId="478"/>
+          <ac:spMkLst>
+            <pc:docMk/>
+            <pc:sldMk cId="2665960598" sldId="261"/>
+            <ac:spMk id="13" creationId="{A5CBB639-8546-265D-CEC9-3DCCB13845C2}"/>
+          </ac:spMkLst>
+        </pc:spChg>
+        <pc:spChg chg="del">
+          <ac:chgData name="Sergio Ibarra" userId="f9e6e0322c927b48" providerId="LiveId" clId="{7EABF997-40C1-4229-B033-0C29FF3C3FDD}" dt="2023-05-30T15:53:06.625" v="0" actId="478"/>
+          <ac:spMkLst>
+            <pc:docMk/>
+            <pc:sldMk cId="2665960598" sldId="261"/>
+            <ac:spMk id="14" creationId="{ED21C892-A308-1335-8AEB-1404693A35E7}"/>
+          </ac:spMkLst>
+        </pc:spChg>
+        <pc:spChg chg="mod">
+          <ac:chgData name="Sergio Ibarra" userId="f9e6e0322c927b48" providerId="LiveId" clId="{7EABF997-40C1-4229-B033-0C29FF3C3FDD}" dt="2023-05-30T15:53:43.835" v="4" actId="947"/>
+          <ac:spMkLst>
+            <pc:docMk/>
+            <pc:sldMk cId="2665960598" sldId="261"/>
+            <ac:spMk id="20" creationId="{5EC5DD05-E6E3-0DE2-5A5D-8F287A1586A4}"/>
+          </ac:spMkLst>
+        </pc:spChg>
+        <pc:spChg chg="mod">
+          <ac:chgData name="Sergio Ibarra" userId="f9e6e0322c927b48" providerId="LiveId" clId="{7EABF997-40C1-4229-B033-0C29FF3C3FDD}" dt="2023-05-30T15:53:58.888" v="7"/>
+          <ac:spMkLst>
+            <pc:docMk/>
+            <pc:sldMk cId="2665960598" sldId="261"/>
+            <ac:spMk id="22" creationId="{8E26EFB9-D145-46C7-C9A8-C7D7B9EABF1D}"/>
+          </ac:spMkLst>
+        </pc:spChg>
+        <pc:spChg chg="add mod">
+          <ac:chgData name="Sergio Ibarra" userId="f9e6e0322c927b48" providerId="LiveId" clId="{7EABF997-40C1-4229-B033-0C29FF3C3FDD}" dt="2023-05-30T15:53:07.546" v="1"/>
+          <ac:spMkLst>
+            <pc:docMk/>
+            <pc:sldMk cId="2665960598" sldId="261"/>
+            <ac:spMk id="28" creationId="{AA9F2FE4-A7CA-97E3-7273-C75D57FDD65D}"/>
+          </ac:spMkLst>
+        </pc:spChg>
+        <pc:spChg chg="add mod">
+          <ac:chgData name="Sergio Ibarra" userId="f9e6e0322c927b48" providerId="LiveId" clId="{7EABF997-40C1-4229-B033-0C29FF3C3FDD}" dt="2023-05-30T15:53:07.546" v="1"/>
+          <ac:spMkLst>
+            <pc:docMk/>
+            <pc:sldMk cId="2665960598" sldId="261"/>
+            <ac:spMk id="29" creationId="{40C27ABD-299D-F7D2-95F6-C847352586E3}"/>
+          </ac:spMkLst>
+        </pc:spChg>
+        <pc:spChg chg="add mod">
+          <ac:chgData name="Sergio Ibarra" userId="f9e6e0322c927b48" providerId="LiveId" clId="{7EABF997-40C1-4229-B033-0C29FF3C3FDD}" dt="2023-05-30T15:53:07.546" v="1"/>
+          <ac:spMkLst>
+            <pc:docMk/>
+            <pc:sldMk cId="2665960598" sldId="261"/>
+            <ac:spMk id="30" creationId="{B188BC0C-B6F1-FB83-4EC9-AF4E796C039B}"/>
+          </ac:spMkLst>
+        </pc:spChg>
+        <pc:spChg chg="add mod">
+          <ac:chgData name="Sergio Ibarra" userId="f9e6e0322c927b48" providerId="LiveId" clId="{7EABF997-40C1-4229-B033-0C29FF3C3FDD}" dt="2023-05-30T15:53:07.546" v="1"/>
+          <ac:spMkLst>
+            <pc:docMk/>
+            <pc:sldMk cId="2665960598" sldId="261"/>
+            <ac:spMk id="32" creationId="{DC4842FB-F914-8951-AF6C-490177779B80}"/>
+          </ac:spMkLst>
+        </pc:spChg>
+        <pc:spChg chg="add mod">
+          <ac:chgData name="Sergio Ibarra" userId="f9e6e0322c927b48" providerId="LiveId" clId="{7EABF997-40C1-4229-B033-0C29FF3C3FDD}" dt="2023-05-30T15:53:07.546" v="1"/>
+          <ac:spMkLst>
+            <pc:docMk/>
+            <pc:sldMk cId="2665960598" sldId="261"/>
+            <ac:spMk id="33" creationId="{F02E3659-BF49-3676-90D6-AF59E5FC1E8A}"/>
+          </ac:spMkLst>
+        </pc:spChg>
+        <pc:spChg chg="add mod">
+          <ac:chgData name="Sergio Ibarra" userId="f9e6e0322c927b48" providerId="LiveId" clId="{7EABF997-40C1-4229-B033-0C29FF3C3FDD}" dt="2023-05-30T15:53:07.546" v="1"/>
+          <ac:spMkLst>
+            <pc:docMk/>
+            <pc:sldMk cId="2665960598" sldId="261"/>
+            <ac:spMk id="34" creationId="{88BEBDC0-10FA-C061-4846-E17491169B1D}"/>
+          </ac:spMkLst>
+        </pc:spChg>
+        <pc:spChg chg="del">
+          <ac:chgData name="Sergio Ibarra" userId="f9e6e0322c927b48" providerId="LiveId" clId="{7EABF997-40C1-4229-B033-0C29FF3C3FDD}" dt="2023-05-30T15:53:06.625" v="0" actId="478"/>
+          <ac:spMkLst>
+            <pc:docMk/>
+            <pc:sldMk cId="2665960598" sldId="261"/>
+            <ac:spMk id="97" creationId="{00000000-0000-0000-0000-000000000000}"/>
+          </ac:spMkLst>
+        </pc:spChg>
+        <pc:graphicFrameChg chg="del">
+          <ac:chgData name="Sergio Ibarra" userId="f9e6e0322c927b48" providerId="LiveId" clId="{7EABF997-40C1-4229-B033-0C29FF3C3FDD}" dt="2023-05-30T15:53:06.625" v="0" actId="478"/>
+          <ac:graphicFrameMkLst>
+            <pc:docMk/>
+            <pc:sldMk cId="2665960598" sldId="261"/>
+            <ac:graphicFrameMk id="26" creationId="{79D1F590-B4A2-3A6D-9C54-00D31BD11644}"/>
+          </ac:graphicFrameMkLst>
+        </pc:graphicFrameChg>
+        <pc:graphicFrameChg chg="add mod">
+          <ac:chgData name="Sergio Ibarra" userId="f9e6e0322c927b48" providerId="LiveId" clId="{7EABF997-40C1-4229-B033-0C29FF3C3FDD}" dt="2023-05-30T15:53:07.546" v="1"/>
+          <ac:graphicFrameMkLst>
+            <pc:docMk/>
+            <pc:sldMk cId="2665960598" sldId="261"/>
+            <ac:graphicFrameMk id="35" creationId="{DCF467F2-2866-EB6C-E2D1-857FCBA81D26}"/>
+          </ac:graphicFrameMkLst>
+        </pc:graphicFrameChg>
+      </pc:sldChg>
+    </pc:docChg>
+  </pc:docChgLst>
+</pc:chgInfo>
 </file>
 
 <file path=ppt/notesMasters/notesMaster1.xml><?xml version="1.0" encoding="utf-8"?>
@@ -1763,7 +1936,7 @@
             </a:pPr>
             <a:fld id="{00000000-1234-1234-1234-123412341234}" type="slidenum">
               <a:rPr lang="en-US"/>
-              <a:t>‹nº›</a:t>
+              <a:t>‹#›</a:t>
             </a:fld>
             <a:endParaRPr/>
           </a:p>
@@ -2691,7 +2864,7 @@
             </a:pPr>
             <a:fld id="{00000000-1234-1234-1234-123412341234}" type="slidenum">
               <a:rPr lang="en-US"/>
-              <a:t>‹nº›</a:t>
+              <a:t>‹#›</a:t>
             </a:fld>
             <a:endParaRPr/>
           </a:p>
@@ -3610,7 +3783,7 @@
             </a:pPr>
             <a:fld id="{00000000-1234-1234-1234-123412341234}" type="slidenum">
               <a:rPr lang="en-US"/>
-              <a:t>‹nº›</a:t>
+              <a:t>‹#›</a:t>
             </a:fld>
             <a:endParaRPr/>
           </a:p>
@@ -4529,7 +4702,7 @@
             </a:pPr>
             <a:fld id="{00000000-1234-1234-1234-123412341234}" type="slidenum">
               <a:rPr lang="en-US"/>
-              <a:t>‹nº›</a:t>
+              <a:t>‹#›</a:t>
             </a:fld>
             <a:endParaRPr/>
           </a:p>
@@ -5481,7 +5654,7 @@
             </a:pPr>
             <a:fld id="{00000000-1234-1234-1234-123412341234}" type="slidenum">
               <a:rPr lang="en-US"/>
-              <a:t>‹nº›</a:t>
+              <a:t>‹#›</a:t>
             </a:fld>
             <a:endParaRPr/>
           </a:p>
@@ -6578,7 +6751,7 @@
             </a:pPr>
             <a:fld id="{00000000-1234-1234-1234-123412341234}" type="slidenum">
               <a:rPr lang="en-US"/>
-              <a:t>‹nº›</a:t>
+              <a:t>‹#›</a:t>
             </a:fld>
             <a:endParaRPr/>
           </a:p>
@@ -7204,7 +7377,7 @@
             </a:pPr>
             <a:fld id="{00000000-1234-1234-1234-123412341234}" type="slidenum">
               <a:rPr lang="en-US"/>
-              <a:t>‹nº›</a:t>
+              <a:t>‹#›</a:t>
             </a:fld>
             <a:endParaRPr/>
           </a:p>
@@ -7963,7 +8136,7 @@
             </a:pPr>
             <a:fld id="{00000000-1234-1234-1234-123412341234}" type="slidenum">
               <a:rPr lang="en-US"/>
-              <a:t>‹nº›</a:t>
+              <a:t>‹#›</a:t>
             </a:fld>
             <a:endParaRPr/>
           </a:p>
@@ -9398,7 +9571,7 @@
             </a:pPr>
             <a:fld id="{00000000-1234-1234-1234-123412341234}" type="slidenum">
               <a:rPr lang="en-US"/>
-              <a:t>‹nº›</a:t>
+              <a:t>‹#›</a:t>
             </a:fld>
             <a:endParaRPr/>
           </a:p>
@@ -10495,7 +10668,7 @@
             </a:pPr>
             <a:fld id="{00000000-1234-1234-1234-123412341234}" type="slidenum">
               <a:rPr lang="en-US"/>
-              <a:t>‹nº›</a:t>
+              <a:t>‹#›</a:t>
             </a:fld>
             <a:endParaRPr/>
           </a:p>
@@ -11719,7 +11892,7 @@
             </a:pPr>
             <a:fld id="{00000000-1234-1234-1234-123412341234}" type="slidenum">
               <a:rPr lang="en-US"/>
-              <a:t>‹nº›</a:t>
+              <a:t>‹#›</a:t>
             </a:fld>
             <a:endParaRPr sz="1400">
               <a:solidFill>
@@ -13106,44 +13279,6 @@
           </a:p>
         </p:txBody>
       </p:sp>
-      <p:sp>
-        <p:nvSpPr>
-          <p:cNvPr id="97" name="Google Shape;97;p1"/>
-          <p:cNvSpPr txBox="1"/>
-          <p:nvPr/>
-        </p:nvSpPr>
-        <p:spPr>
-          <a:xfrm>
-            <a:off x="760900" y="5710632"/>
-            <a:ext cx="5486400" cy="400200"/>
-          </a:xfrm>
-          <a:prstGeom prst="rect">
-            <a:avLst/>
-          </a:prstGeom>
-          <a:noFill/>
-          <a:ln>
-            <a:noFill/>
-          </a:ln>
-        </p:spPr>
-        <p:txBody>
-          <a:bodyPr spcFirstLastPara="1" wrap="square" lIns="91425" tIns="91425" rIns="91425" bIns="91425" anchor="t" anchorCtr="0">
-            <a:spAutoFit/>
-          </a:bodyPr>
-          <a:lstStyle/>
-          <a:p>
-            <a:pPr marL="0" lvl="0" indent="0" algn="l" rtl="0">
-              <a:spcBef>
-                <a:spcPts val="0"/>
-              </a:spcBef>
-              <a:spcAft>
-                <a:spcPts val="0"/>
-              </a:spcAft>
-              <a:buNone/>
-            </a:pPr>
-            <a:endParaRPr/>
-          </a:p>
-        </p:txBody>
-      </p:sp>
       <p:pic>
         <p:nvPicPr>
           <p:cNvPr id="1026" name="Picture 2" descr="Inicio - Instituto de Ciencias de la Atmósfera y Cambio Climático">
@@ -13377,67 +13512,6 @@
       </p:sp>
       <p:sp>
         <p:nvSpPr>
-          <p:cNvPr id="7" name="Google Shape;88;p1">
-            <a:extLst>
-              <a:ext uri="{FF2B5EF4-FFF2-40B4-BE49-F238E27FC236}">
-                <a16:creationId xmlns:a16="http://schemas.microsoft.com/office/drawing/2014/main" id="{D710EB25-DDE1-53D5-9BFB-95579D8E7A2D}"/>
-              </a:ext>
-            </a:extLst>
-          </p:cNvPr>
-          <p:cNvSpPr/>
-          <p:nvPr/>
-        </p:nvSpPr>
-        <p:spPr>
-          <a:xfrm>
-            <a:off x="356870" y="3914259"/>
-            <a:ext cx="9134090" cy="3378336"/>
-          </a:xfrm>
-          <a:prstGeom prst="roundRect">
-            <a:avLst>
-              <a:gd name="adj" fmla="val 1512"/>
-            </a:avLst>
-          </a:prstGeom>
-          <a:solidFill>
-            <a:schemeClr val="accent5"/>
-          </a:solidFill>
-          <a:ln w="9525" cap="flat" cmpd="sng">
-            <a:solidFill>
-              <a:schemeClr val="dk1"/>
-            </a:solidFill>
-            <a:prstDash val="solid"/>
-            <a:miter lim="800000"/>
-            <a:headEnd type="none" w="sm" len="sm"/>
-            <a:tailEnd type="none" w="sm" len="sm"/>
-          </a:ln>
-        </p:spPr>
-        <p:txBody>
-          <a:bodyPr spcFirstLastPara="1" wrap="square" lIns="91425" tIns="45700" rIns="91425" bIns="45700" anchor="ctr" anchorCtr="0">
-            <a:noAutofit/>
-          </a:bodyPr>
-          <a:lstStyle/>
-          <a:p>
-            <a:pPr lvl="0" algn="ctr">
-              <a:lnSpc>
-                <a:spcPct val="95000"/>
-              </a:lnSpc>
-              <a:buClr>
-                <a:schemeClr val="dk1"/>
-              </a:buClr>
-              <a:buSzPts val="1200"/>
-            </a:pPr>
-            <a:endParaRPr lang="en-US" sz="1000" b="0" i="0" dirty="0">
-              <a:solidFill>
-                <a:schemeClr val="dk1"/>
-              </a:solidFill>
-              <a:latin typeface="+mn-lt"/>
-              <a:ea typeface="Cambria Math" panose="02040503050406030204" pitchFamily="18" charset="0"/>
-              <a:sym typeface="Arial"/>
-            </a:endParaRPr>
-          </a:p>
-        </p:txBody>
-      </p:sp>
-      <p:sp>
-        <p:nvSpPr>
           <p:cNvPr id="8" name="Google Shape;88;p1">
             <a:extLst>
               <a:ext uri="{FF2B5EF4-FFF2-40B4-BE49-F238E27FC236}">
@@ -13459,7 +13533,7 @@
             </a:avLst>
           </a:prstGeom>
           <a:solidFill>
-            <a:srgbClr val="C7E6A4"/>
+            <a:srgbClr val="9FF6A8"/>
           </a:solidFill>
           <a:ln w="9525" cap="flat" cmpd="sng">
             <a:solidFill>
@@ -13844,176 +13918,6 @@
               <a:t>Aplicación</a:t>
             </a:r>
             <a:endParaRPr lang="es-MX" sz="1700" dirty="0"/>
-          </a:p>
-        </p:txBody>
-      </p:sp>
-      <p:sp>
-        <p:nvSpPr>
-          <p:cNvPr id="13" name="Google Shape;95;p1">
-            <a:extLst>
-              <a:ext uri="{FF2B5EF4-FFF2-40B4-BE49-F238E27FC236}">
-                <a16:creationId xmlns:a16="http://schemas.microsoft.com/office/drawing/2014/main" id="{A5CBB639-8546-265D-CEC9-3DCCB13845C2}"/>
-              </a:ext>
-            </a:extLst>
-          </p:cNvPr>
-          <p:cNvSpPr txBox="1"/>
-          <p:nvPr/>
-        </p:nvSpPr>
-        <p:spPr>
-          <a:xfrm>
-            <a:off x="378293" y="3941267"/>
-            <a:ext cx="2216100" cy="314320"/>
-          </a:xfrm>
-          <a:prstGeom prst="rect">
-            <a:avLst/>
-          </a:prstGeom>
-          <a:noFill/>
-          <a:ln>
-            <a:noFill/>
-          </a:ln>
-        </p:spPr>
-        <p:txBody>
-          <a:bodyPr spcFirstLastPara="1" wrap="square" lIns="52225" tIns="26100" rIns="52225" bIns="26100" anchor="t" anchorCtr="0">
-            <a:spAutoFit/>
-          </a:bodyPr>
-          <a:lstStyle/>
-          <a:p>
-            <a:pPr marL="0" marR="0" lvl="0" indent="0" algn="l" rtl="0">
-              <a:lnSpc>
-                <a:spcPct val="100000"/>
-              </a:lnSpc>
-              <a:spcBef>
-                <a:spcPts val="0"/>
-              </a:spcBef>
-              <a:spcAft>
-                <a:spcPts val="0"/>
-              </a:spcAft>
-              <a:buClr>
-                <a:schemeClr val="dk1"/>
-              </a:buClr>
-              <a:buSzPts val="2000"/>
-              <a:buFont typeface="Arial"/>
-              <a:buNone/>
-            </a:pPr>
-            <a:r>
-              <a:rPr lang="es-MX" sz="1700" b="1" i="0" u="none" dirty="0">
-                <a:solidFill>
-                  <a:schemeClr val="dk1"/>
-                </a:solidFill>
-                <a:latin typeface="Arial"/>
-                <a:ea typeface="Arial"/>
-                <a:cs typeface="Arial"/>
-                <a:sym typeface="Arial"/>
-              </a:rPr>
-              <a:t>Marco Teórico </a:t>
-            </a:r>
-            <a:endParaRPr lang="es-MX" sz="1700" dirty="0"/>
-          </a:p>
-        </p:txBody>
-      </p:sp>
-      <p:sp>
-        <p:nvSpPr>
-          <p:cNvPr id="14" name="Google Shape;89;p1">
-            <a:extLst>
-              <a:ext uri="{FF2B5EF4-FFF2-40B4-BE49-F238E27FC236}">
-                <a16:creationId xmlns:a16="http://schemas.microsoft.com/office/drawing/2014/main" id="{ED21C892-A308-1335-8AEB-1404693A35E7}"/>
-              </a:ext>
-            </a:extLst>
-          </p:cNvPr>
-          <p:cNvSpPr txBox="1"/>
-          <p:nvPr/>
-        </p:nvSpPr>
-        <p:spPr>
-          <a:xfrm>
-            <a:off x="378293" y="4198053"/>
-            <a:ext cx="8975873" cy="929873"/>
-          </a:xfrm>
-          <a:prstGeom prst="rect">
-            <a:avLst/>
-          </a:prstGeom>
-          <a:noFill/>
-          <a:ln>
-            <a:noFill/>
-          </a:ln>
-        </p:spPr>
-        <p:txBody>
-          <a:bodyPr spcFirstLastPara="1" wrap="square" lIns="52225" tIns="26100" rIns="52225" bIns="26100" anchor="t" anchorCtr="0">
-            <a:spAutoFit/>
-          </a:bodyPr>
-          <a:lstStyle/>
-          <a:p>
-            <a:pPr marL="0" marR="0" lvl="0" indent="0" algn="just" rtl="0">
-              <a:lnSpc>
-                <a:spcPct val="95000"/>
-              </a:lnSpc>
-              <a:spcBef>
-                <a:spcPts val="0"/>
-              </a:spcBef>
-              <a:spcAft>
-                <a:spcPts val="0"/>
-              </a:spcAft>
-              <a:buClr>
-                <a:schemeClr val="dk1"/>
-              </a:buClr>
-              <a:buSzPts val="1200"/>
-              <a:buFont typeface="Times New Roman"/>
-              <a:buNone/>
-            </a:pPr>
-            <a:r>
-              <a:rPr lang="es-MX" sz="1000" dirty="0">
-                <a:solidFill>
-                  <a:schemeClr val="tx1"/>
-                </a:solidFill>
-                <a:latin typeface="+mn-lt"/>
-              </a:rPr>
-              <a:t>La teoría de pronósticos busca determinar el valor más probable de una variable dependiente (Y) en función de variables independientes (x1,x2, x3, etc.) . En este caso se abordarán dos casos principalmente , </a:t>
-            </a:r>
-          </a:p>
-          <a:p>
-            <a:pPr marL="0" marR="0" lvl="0" indent="0" algn="just" rtl="0">
-              <a:lnSpc>
-                <a:spcPct val="95000"/>
-              </a:lnSpc>
-              <a:spcBef>
-                <a:spcPts val="0"/>
-              </a:spcBef>
-              <a:spcAft>
-                <a:spcPts val="0"/>
-              </a:spcAft>
-              <a:buClr>
-                <a:schemeClr val="dk1"/>
-              </a:buClr>
-              <a:buSzPts val="1200"/>
-              <a:buFont typeface="Times New Roman"/>
-              <a:buNone/>
-            </a:pPr>
-            <a:r>
-              <a:rPr lang="es-MX" sz="1000" dirty="0">
-                <a:solidFill>
-                  <a:schemeClr val="tx1"/>
-                </a:solidFill>
-                <a:latin typeface="+mn-lt"/>
-              </a:rPr>
-              <a:t>A) El modelo lineal generalizado (GLM, por sus siglas en inglés) es aquel en el que el valor de la variable a pronosticar Y se calcula como una combinación lineal de las variables predictoras x1, x2,..xn. Dicha combinación lineal puede ser “transformada” mediante una función denominada función link que permitirá usar el concepto de GLM para explicar relaciones lineales no simples (</a:t>
-            </a:r>
-            <a:r>
-              <a:rPr lang="es-MX" sz="1000" dirty="0" err="1">
-                <a:solidFill>
-                  <a:schemeClr val="tx1"/>
-                </a:solidFill>
-                <a:latin typeface="+mn-lt"/>
-              </a:rPr>
-              <a:t>eg</a:t>
-            </a:r>
-            <a:r>
-              <a:rPr lang="es-MX" sz="1000" dirty="0">
-                <a:solidFill>
-                  <a:schemeClr val="tx1"/>
-                </a:solidFill>
-                <a:latin typeface="+mn-lt"/>
-              </a:rPr>
-              <a:t>. Binomiales, Poisson). Se presenta la ecuación la ecuación general de los GML así como las funciones link que se usaría en ciertos casos particulares:</a:t>
-            </a:r>
           </a:p>
         </p:txBody>
       </p:sp>
@@ -15053,6 +14957,30 @@
               </a:rPr>
               <a:t>De igual manera se llevó a cabo un pronóstico de los mismos 12 meses usando los modelos de series de tiempo de ARIMA (Utilizando datos de 201 meses como ‘datos de entrenamiento’) con base en los resultados de las gráficas de ACF &amp; PACF </a:t>
             </a:r>
+            <a:r>
+              <a:rPr lang="es-MX" sz="1050" baseline="30000" dirty="0">
+                <a:solidFill>
+                  <a:schemeClr val="tx1"/>
+                </a:solidFill>
+                <a:latin typeface="+mn-lt"/>
+                <a:ea typeface="Encode Sans ExtraLight"/>
+                <a:cs typeface="Encode Sans ExtraLight"/>
+                <a:sym typeface="Encode Sans ExtraLight"/>
+              </a:rPr>
+              <a:t>3</a:t>
+            </a:r>
+            <a:r>
+              <a:rPr lang="es-MX" sz="1050" dirty="0">
+                <a:solidFill>
+                  <a:schemeClr val="tx1"/>
+                </a:solidFill>
+                <a:latin typeface="+mn-lt"/>
+                <a:ea typeface="Encode Sans ExtraLight"/>
+                <a:cs typeface="Encode Sans ExtraLight"/>
+                <a:sym typeface="Encode Sans ExtraLight"/>
+              </a:rPr>
+              <a:t> </a:t>
+            </a:r>
           </a:p>
           <a:p>
             <a:pPr marL="0" marR="0" lvl="0" indent="0" algn="just" rtl="0">
@@ -15099,7 +15027,7 @@
         <p:spPr>
           <a:xfrm>
             <a:off x="5025391" y="12421859"/>
-            <a:ext cx="4357658" cy="1823897"/>
+            <a:ext cx="4357658" cy="1836721"/>
           </a:xfrm>
           <a:prstGeom prst="rect">
             <a:avLst/>
@@ -15166,9 +15094,6 @@
               <a:spcBef>
                 <a:spcPts val="905"/>
               </a:spcBef>
-              <a:spcAft>
-                <a:spcPts val="0"/>
-              </a:spcAft>
             </a:pPr>
             <a:r>
               <a:rPr lang="en-US" sz="900" dirty="0">
@@ -15177,28 +15102,46 @@
                 </a:solidFill>
                 <a:latin typeface="+mn-lt"/>
               </a:rPr>
-              <a:t>2. S. Ali, “Reading the ACF and PACF Plots — The Missing Manual / </a:t>
+              <a:t>2. </a:t>
             </a:r>
             <a:r>
-              <a:rPr lang="en-US" sz="900" dirty="0" err="1">
+              <a:rPr lang="es-MX" sz="900" dirty="0" err="1">
                 <a:solidFill>
                   <a:schemeClr val="tx1"/>
                 </a:solidFill>
                 <a:latin typeface="+mn-lt"/>
               </a:rPr>
-              <a:t>Cheatsheet</a:t>
+              <a:t>Durbán</a:t>
             </a:r>
             <a:r>
-              <a:rPr lang="en-US" sz="900" dirty="0">
+              <a:rPr lang="es-MX" sz="900" dirty="0">
                 <a:solidFill>
                   <a:schemeClr val="tx1"/>
                 </a:solidFill>
                 <a:latin typeface="+mn-lt"/>
               </a:rPr>
-              <a:t>”. linkedin.com. </a:t>
+              <a:t> </a:t>
             </a:r>
             <a:r>
-              <a:rPr lang="es-ES" sz="900" dirty="0">
+              <a:rPr lang="es-MX" sz="900" dirty="0" err="1">
+                <a:solidFill>
+                  <a:schemeClr val="tx1"/>
+                </a:solidFill>
+                <a:latin typeface="+mn-lt"/>
+              </a:rPr>
+              <a:t>Maria</a:t>
+            </a:r>
+            <a:r>
+              <a:rPr lang="es-MX" sz="900" dirty="0">
+                <a:solidFill>
+                  <a:schemeClr val="tx1"/>
+                </a:solidFill>
+                <a:latin typeface="+mn-lt"/>
+              </a:rPr>
+              <a:t>, Universidad Carlos Tercero de Madrid, Curso de Modelos Lineales Generalizados (</a:t>
+            </a:r>
+            <a:r>
+              <a:rPr lang="es-MX" sz="900" dirty="0">
                 <a:solidFill>
                   <a:schemeClr val="tx1"/>
                 </a:solidFill>
@@ -15211,35 +15154,47 @@
                   </a:extLst>
                 </a:hlinkClick>
               </a:rPr>
-              <a:t>https://www.linkedin.com/pulse/reading-acf-pacf-plots-missing-manual-cheatsheet-saqib-ali/</a:t>
+              <a:t>curso_glm.pdf (uc3m.es)</a:t>
             </a:r>
-            <a:endParaRPr lang="es-MX" sz="900" dirty="0">
-              <a:solidFill>
-                <a:schemeClr val="tx1"/>
-              </a:solidFill>
-              <a:latin typeface="+mn-lt"/>
-            </a:endParaRPr>
+            <a:r>
+              <a:rPr lang="es-MX" sz="900" dirty="0">
+                <a:solidFill>
+                  <a:schemeClr val="tx1"/>
+                </a:solidFill>
+                <a:latin typeface="+mn-lt"/>
+              </a:rPr>
+              <a:t>)</a:t>
+            </a:r>
           </a:p>
           <a:p>
-            <a:pPr marL="127635" marR="0">
+            <a:pPr marL="127635" marR="535305">
               <a:lnSpc>
                 <a:spcPct val="107000"/>
               </a:lnSpc>
               <a:spcBef>
-                <a:spcPts val="795"/>
+                <a:spcPts val="905"/>
               </a:spcBef>
               <a:spcAft>
                 <a:spcPts val="0"/>
               </a:spcAft>
             </a:pPr>
             <a:r>
-              <a:rPr lang="en-US" sz="900" dirty="0">
+              <a:rPr lang="es-MX" sz="900" dirty="0">
                 <a:solidFill>
                   <a:schemeClr val="tx1"/>
                 </a:solidFill>
                 <a:latin typeface="+mn-lt"/>
               </a:rPr>
-              <a:t>3. “</a:t>
+              <a:t>3. </a:t>
+            </a:r>
+            <a:r>
+              <a:rPr lang="en-US" sz="900" dirty="0">
+                <a:solidFill>
+                  <a:schemeClr val="tx1"/>
+                </a:solidFill>
+                <a:latin typeface="+mn-lt"/>
+              </a:rPr>
+              <a:t>“</a:t>
             </a:r>
             <a:r>
               <a:rPr lang="en-US" sz="900" dirty="0" err="1">
@@ -15358,1409 +15313,6 @@
           </a:p>
         </p:txBody>
       </p:sp>
-      <p:sp>
-        <p:nvSpPr>
-          <p:cNvPr id="2" name="Google Shape;89;p1">
-            <a:extLst>
-              <a:ext uri="{FF2B5EF4-FFF2-40B4-BE49-F238E27FC236}">
-                <a16:creationId xmlns:a16="http://schemas.microsoft.com/office/drawing/2014/main" id="{290B10F5-34AB-9F35-3B00-09E9158E64E0}"/>
-              </a:ext>
-            </a:extLst>
-          </p:cNvPr>
-          <p:cNvSpPr txBox="1"/>
-          <p:nvPr/>
-        </p:nvSpPr>
-        <p:spPr>
-          <a:xfrm>
-            <a:off x="378293" y="5966017"/>
-            <a:ext cx="9015465" cy="637485"/>
-          </a:xfrm>
-          <a:prstGeom prst="rect">
-            <a:avLst/>
-          </a:prstGeom>
-          <a:noFill/>
-          <a:ln>
-            <a:noFill/>
-          </a:ln>
-        </p:spPr>
-        <p:txBody>
-          <a:bodyPr spcFirstLastPara="1" wrap="square" lIns="52225" tIns="26100" rIns="52225" bIns="26100" anchor="t" anchorCtr="0">
-            <a:spAutoFit/>
-          </a:bodyPr>
-          <a:lstStyle/>
-          <a:p>
-            <a:pPr marL="0" marR="0" lvl="0" indent="0" algn="just" rtl="0">
-              <a:lnSpc>
-                <a:spcPct val="95000"/>
-              </a:lnSpc>
-              <a:spcBef>
-                <a:spcPts val="0"/>
-              </a:spcBef>
-              <a:spcAft>
-                <a:spcPts val="0"/>
-              </a:spcAft>
-              <a:buClr>
-                <a:schemeClr val="dk1"/>
-              </a:buClr>
-              <a:buSzPts val="1200"/>
-              <a:buFont typeface="Times New Roman"/>
-              <a:buNone/>
-            </a:pPr>
-            <a:r>
-              <a:rPr lang="es-MX" sz="1000" dirty="0">
-                <a:solidFill>
-                  <a:schemeClr val="tx1"/>
-                </a:solidFill>
-                <a:latin typeface="+mn-lt"/>
-              </a:rPr>
-              <a:t>B) Los modelos de series de tiempo donde se pretende conocer el valor de la variable a </a:t>
-            </a:r>
-            <a:r>
-              <a:rPr lang="es-MX" sz="1000" u="sng" dirty="0">
-                <a:solidFill>
-                  <a:schemeClr val="tx1"/>
-                </a:solidFill>
-                <a:latin typeface="+mn-lt"/>
-              </a:rPr>
-              <a:t>pronosticar</a:t>
-            </a:r>
-            <a:r>
-              <a:rPr lang="es-MX" sz="1000" dirty="0">
-                <a:solidFill>
-                  <a:schemeClr val="tx1"/>
-                </a:solidFill>
-                <a:latin typeface="+mn-lt"/>
-              </a:rPr>
-              <a:t> a tiempo t, como una combinación lineal de los valores de la misma variable y los errores a tiempos pasados (t-s) más un término de error o “ruido blanco” que da cuenta por la propia aleatoriedad del fenómeno. Un tipo de modelos muy usados en series de tiempo son los modelos llamados Auto-Regresivos y de Medias Móviles (ARIMA) que tienen la siguiente ecuación general:</a:t>
-            </a:r>
-          </a:p>
-        </p:txBody>
-      </p:sp>
-      <mc:AlternateContent xmlns:mc="http://schemas.openxmlformats.org/markup-compatibility/2006">
-        <mc:Choice xmlns:a14="http://schemas.microsoft.com/office/drawing/2010/main" Requires="a14">
-          <p:sp>
-            <p:nvSpPr>
-              <p:cNvPr id="4" name="Google Shape;89;p1">
-                <a:extLst>
-                  <a:ext uri="{FF2B5EF4-FFF2-40B4-BE49-F238E27FC236}">
-                    <a16:creationId xmlns:a16="http://schemas.microsoft.com/office/drawing/2014/main" id="{A03C1D89-0E0E-5B2B-11E3-9F0758203DB2}"/>
-                  </a:ext>
-                </a:extLst>
-              </p:cNvPr>
-              <p:cNvSpPr txBox="1"/>
-              <p:nvPr/>
-            </p:nvSpPr>
-            <p:spPr>
-              <a:xfrm>
-                <a:off x="2834743" y="6468296"/>
-                <a:ext cx="4567044" cy="1002970"/>
-              </a:xfrm>
-              <a:prstGeom prst="rect">
-                <a:avLst/>
-              </a:prstGeom>
-              <a:noFill/>
-              <a:ln>
-                <a:noFill/>
-              </a:ln>
-            </p:spPr>
-            <p:txBody>
-              <a:bodyPr spcFirstLastPara="1" wrap="square" lIns="52225" tIns="26100" rIns="52225" bIns="26100" anchor="t" anchorCtr="0">
-                <a:spAutoFit/>
-              </a:bodyPr>
-              <a:lstStyle/>
-              <a:p>
-                <a:pPr lvl="0" algn="ctr">
-                  <a:lnSpc>
-                    <a:spcPct val="95000"/>
-                  </a:lnSpc>
-                  <a:buClr>
-                    <a:schemeClr val="dk1"/>
-                  </a:buClr>
-                  <a:buSzPts val="1200"/>
-                </a:pPr>
-                <a:r>
-                  <a:rPr lang="es-MX" sz="900" i="1" dirty="0" err="1">
-                    <a:solidFill>
-                      <a:schemeClr val="tx1"/>
-                    </a:solidFill>
-                    <a:latin typeface="Cambria Math" panose="02040503050406030204" pitchFamily="18" charset="0"/>
-                    <a:ea typeface="Cambria Math" panose="02040503050406030204" pitchFamily="18" charset="0"/>
-                  </a:rPr>
-                  <a:t>Yt</a:t>
-                </a:r>
-                <a:r>
-                  <a:rPr lang="es-MX" sz="900" i="1" dirty="0">
-                    <a:solidFill>
-                      <a:schemeClr val="tx1"/>
-                    </a:solidFill>
-                    <a:latin typeface="Cambria Math" panose="02040503050406030204" pitchFamily="18" charset="0"/>
-                    <a:ea typeface="Cambria Math" panose="02040503050406030204" pitchFamily="18" charset="0"/>
-                  </a:rPr>
-                  <a:t> = </a:t>
-                </a:r>
-                <a:r>
-                  <a:rPr lang="el-GR" sz="900" i="1" dirty="0">
-                    <a:solidFill>
-                      <a:schemeClr val="tx1"/>
-                    </a:solidFill>
-                    <a:latin typeface="Cambria Math" panose="02040503050406030204" pitchFamily="18" charset="0"/>
-                    <a:ea typeface="Cambria Math" panose="02040503050406030204" pitchFamily="18" charset="0"/>
-                  </a:rPr>
-                  <a:t>φ1 </a:t>
-                </a:r>
-                <a:r>
-                  <a:rPr lang="es-MX" sz="900" i="1" dirty="0">
-                    <a:solidFill>
-                      <a:schemeClr val="tx1"/>
-                    </a:solidFill>
-                    <a:latin typeface="Cambria Math" panose="02040503050406030204" pitchFamily="18" charset="0"/>
-                    <a:ea typeface="Cambria Math" panose="02040503050406030204" pitchFamily="18" charset="0"/>
-                  </a:rPr>
-                  <a:t>Yt−1 + . . . + </a:t>
-                </a:r>
-                <a:r>
-                  <a:rPr lang="el-GR" sz="900" i="1" dirty="0">
-                    <a:solidFill>
-                      <a:schemeClr val="tx1"/>
-                    </a:solidFill>
-                    <a:latin typeface="Cambria Math" panose="02040503050406030204" pitchFamily="18" charset="0"/>
-                    <a:ea typeface="Cambria Math" panose="02040503050406030204" pitchFamily="18" charset="0"/>
-                  </a:rPr>
-                  <a:t>φ</a:t>
-                </a:r>
-                <a:r>
-                  <a:rPr lang="es-MX" sz="900" i="1" dirty="0">
-                    <a:solidFill>
-                      <a:schemeClr val="tx1"/>
-                    </a:solidFill>
-                    <a:latin typeface="Cambria Math" panose="02040503050406030204" pitchFamily="18" charset="0"/>
-                    <a:ea typeface="Cambria Math" panose="02040503050406030204" pitchFamily="18" charset="0"/>
-                  </a:rPr>
-                  <a:t>p </a:t>
-                </a:r>
-                <a:r>
-                  <a:rPr lang="es-MX" sz="900" i="1" dirty="0" err="1">
-                    <a:solidFill>
-                      <a:schemeClr val="tx1"/>
-                    </a:solidFill>
-                    <a:latin typeface="Cambria Math" panose="02040503050406030204" pitchFamily="18" charset="0"/>
-                    <a:ea typeface="Cambria Math" panose="02040503050406030204" pitchFamily="18" charset="0"/>
-                  </a:rPr>
-                  <a:t>Yt</a:t>
-                </a:r>
-                <a:r>
-                  <a:rPr lang="es-MX" sz="900" i="1" dirty="0">
-                    <a:solidFill>
-                      <a:schemeClr val="tx1"/>
-                    </a:solidFill>
-                    <a:latin typeface="Cambria Math" panose="02040503050406030204" pitchFamily="18" charset="0"/>
-                    <a:ea typeface="Cambria Math" panose="02040503050406030204" pitchFamily="18" charset="0"/>
-                  </a:rPr>
-                  <a:t>−p + at + </a:t>
-                </a:r>
-                <a:r>
-                  <a:rPr lang="el-GR" sz="900" i="1" dirty="0">
-                    <a:solidFill>
-                      <a:schemeClr val="tx1"/>
-                    </a:solidFill>
-                    <a:latin typeface="Cambria Math" panose="02040503050406030204" pitchFamily="18" charset="0"/>
-                    <a:ea typeface="Cambria Math" panose="02040503050406030204" pitchFamily="18" charset="0"/>
-                  </a:rPr>
-                  <a:t>θ1 </a:t>
-                </a:r>
-                <a:r>
-                  <a:rPr lang="es-MX" sz="900" i="1" dirty="0">
-                    <a:solidFill>
-                      <a:schemeClr val="tx1"/>
-                    </a:solidFill>
-                    <a:latin typeface="Cambria Math" panose="02040503050406030204" pitchFamily="18" charset="0"/>
-                    <a:ea typeface="Cambria Math" panose="02040503050406030204" pitchFamily="18" charset="0"/>
-                  </a:rPr>
-                  <a:t>at−1 + . . . + </a:t>
-                </a:r>
-                <a:r>
-                  <a:rPr lang="el-GR" sz="900" i="1" dirty="0">
-                    <a:solidFill>
-                      <a:schemeClr val="tx1"/>
-                    </a:solidFill>
-                    <a:latin typeface="Cambria Math" panose="02040503050406030204" pitchFamily="18" charset="0"/>
-                    <a:ea typeface="Cambria Math" panose="02040503050406030204" pitchFamily="18" charset="0"/>
-                  </a:rPr>
-                  <a:t>θ</a:t>
-                </a:r>
-                <a:r>
-                  <a:rPr lang="es-MX" sz="900" i="1" dirty="0">
-                    <a:solidFill>
-                      <a:schemeClr val="tx1"/>
-                    </a:solidFill>
-                    <a:latin typeface="Cambria Math" panose="02040503050406030204" pitchFamily="18" charset="0"/>
-                    <a:ea typeface="Cambria Math" panose="02040503050406030204" pitchFamily="18" charset="0"/>
-                  </a:rPr>
-                  <a:t>q at−q</a:t>
-                </a:r>
-              </a:p>
-              <a:p>
-                <a:pPr lvl="0">
-                  <a:lnSpc>
-                    <a:spcPct val="95000"/>
-                  </a:lnSpc>
-                  <a:buClr>
-                    <a:schemeClr val="dk1"/>
-                  </a:buClr>
-                  <a:buSzPts val="1200"/>
-                </a:pPr>
-                <a:r>
-                  <a:rPr lang="es-MX" sz="900" dirty="0">
-                    <a:solidFill>
-                      <a:schemeClr val="tx1"/>
-                    </a:solidFill>
-                    <a:latin typeface="+mn-lt"/>
-                  </a:rPr>
-                  <a:t>Donde</a:t>
-                </a:r>
-              </a:p>
-              <a:p>
-                <a:pPr lvl="0">
-                  <a:lnSpc>
-                    <a:spcPct val="95000"/>
-                  </a:lnSpc>
-                  <a:buClr>
-                    <a:schemeClr val="dk1"/>
-                  </a:buClr>
-                  <a:buSzPts val="1200"/>
-                </a:pPr>
-                <a:r>
-                  <a:rPr lang="en-US" sz="900" dirty="0" err="1">
-                    <a:solidFill>
-                      <a:schemeClr val="dk1"/>
-                    </a:solidFill>
-                    <a:latin typeface="+mn-lt"/>
-                  </a:rPr>
-                  <a:t>yt</a:t>
-                </a:r>
-                <a:r>
-                  <a:rPr lang="en-US" sz="900" dirty="0">
-                    <a:solidFill>
-                      <a:schemeClr val="dk1"/>
-                    </a:solidFill>
-                    <a:latin typeface="+mn-lt"/>
-                  </a:rPr>
-                  <a:t>: Valor a </a:t>
-                </a:r>
-                <a:r>
-                  <a:rPr lang="en-US" sz="900" dirty="0" err="1">
-                    <a:solidFill>
-                      <a:schemeClr val="dk1"/>
-                    </a:solidFill>
-                    <a:latin typeface="+mn-lt"/>
-                  </a:rPr>
-                  <a:t>pronostica</a:t>
-                </a:r>
-                <a:r>
-                  <a:rPr lang="es-MX" sz="900" dirty="0">
-                    <a:solidFill>
-                      <a:schemeClr val="tx1"/>
-                    </a:solidFill>
-                    <a:latin typeface="+mn-lt"/>
-                  </a:rPr>
-                  <a:t>r de variable y a tiempo t </a:t>
-                </a:r>
-              </a:p>
-              <a:p>
-                <a:pPr lvl="0">
-                  <a:lnSpc>
-                    <a:spcPct val="95000"/>
-                  </a:lnSpc>
-                  <a:buClr>
-                    <a:schemeClr val="dk1"/>
-                  </a:buClr>
-                  <a:buSzPts val="1200"/>
-                </a:pPr>
-                <a:r>
-                  <a:rPr lang="en-US" sz="900" b="0" i="0" dirty="0">
-                    <a:solidFill>
-                      <a:schemeClr val="dk1"/>
-                    </a:solidFill>
-                    <a:latin typeface="Cambria Math" panose="02040503050406030204" pitchFamily="18" charset="0"/>
-                    <a:ea typeface="Cambria Math" panose="02040503050406030204" pitchFamily="18" charset="0"/>
-                    <a:sym typeface="Arial"/>
-                  </a:rPr>
-                  <a:t>𝜃, </a:t>
-                </a:r>
-                <a:r>
-                  <a:rPr lang="el-GR" sz="900" dirty="0"/>
-                  <a:t>φ</a:t>
-                </a:r>
-                <a:r>
-                  <a:rPr lang="en-US" sz="900" b="0" i="0" dirty="0">
-                    <a:solidFill>
-                      <a:schemeClr val="dk1"/>
-                    </a:solidFill>
-                    <a:latin typeface="+mn-lt"/>
-                    <a:ea typeface="Cambria Math" panose="02040503050406030204" pitchFamily="18" charset="0"/>
-                    <a:sym typeface="Arial"/>
-                  </a:rPr>
-                  <a:t>: </a:t>
-                </a:r>
-                <a:r>
-                  <a:rPr lang="en-US" sz="900" b="0" i="0" dirty="0" err="1">
-                    <a:solidFill>
-                      <a:schemeClr val="dk1"/>
-                    </a:solidFill>
-                    <a:latin typeface="+mn-lt"/>
-                    <a:ea typeface="Cambria Math" panose="02040503050406030204" pitchFamily="18" charset="0"/>
-                    <a:sym typeface="Arial"/>
-                  </a:rPr>
-                  <a:t>Parámetros</a:t>
-                </a:r>
-                <a:r>
-                  <a:rPr lang="en-US" sz="900" b="0" i="0" dirty="0">
-                    <a:solidFill>
-                      <a:schemeClr val="dk1"/>
-                    </a:solidFill>
-                    <a:latin typeface="+mn-lt"/>
-                    <a:ea typeface="Cambria Math" panose="02040503050406030204" pitchFamily="18" charset="0"/>
-                    <a:sym typeface="Arial"/>
-                  </a:rPr>
-                  <a:t> a </a:t>
-                </a:r>
-                <a:r>
-                  <a:rPr lang="en-US" sz="900" b="0" i="0" dirty="0" err="1">
-                    <a:solidFill>
-                      <a:schemeClr val="dk1"/>
-                    </a:solidFill>
-                    <a:latin typeface="+mn-lt"/>
-                    <a:ea typeface="Cambria Math" panose="02040503050406030204" pitchFamily="18" charset="0"/>
-                    <a:sym typeface="Arial"/>
-                  </a:rPr>
-                  <a:t>ajustar</a:t>
-                </a:r>
-                <a:r>
-                  <a:rPr lang="en-US" sz="900" b="0" i="0" dirty="0">
-                    <a:solidFill>
-                      <a:schemeClr val="dk1"/>
-                    </a:solidFill>
-                    <a:latin typeface="+mn-lt"/>
-                    <a:ea typeface="Cambria Math" panose="02040503050406030204" pitchFamily="18" charset="0"/>
-                    <a:sym typeface="Arial"/>
-                  </a:rPr>
-                  <a:t> para </a:t>
-                </a:r>
-                <a:r>
-                  <a:rPr lang="en-US" sz="900" b="0" i="0" dirty="0" err="1">
-                    <a:solidFill>
-                      <a:schemeClr val="dk1"/>
-                    </a:solidFill>
-                    <a:latin typeface="+mn-lt"/>
-                    <a:ea typeface="Cambria Math" panose="02040503050406030204" pitchFamily="18" charset="0"/>
-                    <a:sym typeface="Arial"/>
-                  </a:rPr>
-                  <a:t>cada</a:t>
-                </a:r>
-                <a:r>
-                  <a:rPr lang="en-US" sz="900" b="0" i="0" dirty="0">
-                    <a:solidFill>
-                      <a:schemeClr val="dk1"/>
-                    </a:solidFill>
-                    <a:latin typeface="+mn-lt"/>
-                    <a:ea typeface="Cambria Math" panose="02040503050406030204" pitchFamily="18" charset="0"/>
-                    <a:sym typeface="Arial"/>
-                  </a:rPr>
-                  <a:t> </a:t>
-                </a:r>
-                <a:r>
-                  <a:rPr lang="en-US" sz="900" b="0" i="0" dirty="0" err="1">
-                    <a:solidFill>
-                      <a:schemeClr val="dk1"/>
-                    </a:solidFill>
-                    <a:latin typeface="+mn-lt"/>
-                    <a:ea typeface="Cambria Math" panose="02040503050406030204" pitchFamily="18" charset="0"/>
-                    <a:sym typeface="Arial"/>
-                  </a:rPr>
-                  <a:t>caso</a:t>
-                </a:r>
-                <a:r>
-                  <a:rPr lang="en-US" sz="900" b="0" i="0" dirty="0">
-                    <a:solidFill>
-                      <a:schemeClr val="dk1"/>
-                    </a:solidFill>
-                    <a:latin typeface="+mn-lt"/>
-                    <a:ea typeface="Cambria Math" panose="02040503050406030204" pitchFamily="18" charset="0"/>
-                    <a:sym typeface="Arial"/>
-                  </a:rPr>
-                  <a:t> </a:t>
-                </a:r>
-              </a:p>
-              <a:p>
-                <a:pPr lvl="0">
-                  <a:lnSpc>
-                    <a:spcPct val="95000"/>
-                  </a:lnSpc>
-                  <a:buClr>
-                    <a:schemeClr val="dk1"/>
-                  </a:buClr>
-                  <a:buSzPts val="1200"/>
-                </a:pPr>
-                <a:r>
-                  <a:rPr lang="en-US" sz="900" dirty="0" err="1">
-                    <a:solidFill>
-                      <a:schemeClr val="dk1"/>
-                    </a:solidFill>
-                    <a:latin typeface="+mn-lt"/>
-                    <a:ea typeface="Cambria Math" panose="02040503050406030204" pitchFamily="18" charset="0"/>
-                  </a:rPr>
-                  <a:t>y</a:t>
-                </a:r>
-                <a:r>
-                  <a:rPr lang="en-US" sz="900" b="0" i="0" dirty="0" err="1">
-                    <a:solidFill>
-                      <a:schemeClr val="dk1"/>
-                    </a:solidFill>
-                    <a:latin typeface="+mn-lt"/>
-                    <a:ea typeface="Cambria Math" panose="02040503050406030204" pitchFamily="18" charset="0"/>
-                    <a:sym typeface="Arial"/>
-                  </a:rPr>
-                  <a:t>t</a:t>
-                </a:r>
-                <a:r>
-                  <a:rPr lang="en-US" sz="900" b="0" i="0" dirty="0">
-                    <a:solidFill>
-                      <a:schemeClr val="dk1"/>
-                    </a:solidFill>
-                    <a:latin typeface="+mn-lt"/>
-                    <a:ea typeface="Cambria Math" panose="02040503050406030204" pitchFamily="18" charset="0"/>
-                    <a:sym typeface="Arial"/>
-                  </a:rPr>
-                  <a:t>-s: </a:t>
-                </a:r>
-                <a:r>
-                  <a:rPr lang="en-US" sz="900" b="0" i="0" dirty="0" err="1">
-                    <a:solidFill>
-                      <a:schemeClr val="dk1"/>
-                    </a:solidFill>
-                    <a:latin typeface="+mn-lt"/>
-                    <a:ea typeface="Cambria Math" panose="02040503050406030204" pitchFamily="18" charset="0"/>
-                    <a:sym typeface="Arial"/>
-                  </a:rPr>
-                  <a:t>Valores</a:t>
-                </a:r>
-                <a:r>
-                  <a:rPr lang="en-US" sz="900" b="0" i="0" dirty="0">
-                    <a:solidFill>
-                      <a:schemeClr val="dk1"/>
-                    </a:solidFill>
-                    <a:latin typeface="+mn-lt"/>
-                    <a:ea typeface="Cambria Math" panose="02040503050406030204" pitchFamily="18" charset="0"/>
-                    <a:sym typeface="Arial"/>
-                  </a:rPr>
-                  <a:t> de la variable y a t-s </a:t>
-                </a:r>
-              </a:p>
-              <a:p>
-                <a:pPr lvl="0">
-                  <a:lnSpc>
-                    <a:spcPct val="95000"/>
-                  </a:lnSpc>
-                  <a:buClr>
-                    <a:schemeClr val="dk1"/>
-                  </a:buClr>
-                  <a:buSzPts val="1200"/>
-                </a:pPr>
-                <a:r>
-                  <a:rPr lang="es-MX" sz="900" i="1" dirty="0">
-                    <a:solidFill>
-                      <a:schemeClr val="tx1"/>
-                    </a:solidFill>
-                    <a:latin typeface="Cambria Math" panose="02040503050406030204" pitchFamily="18" charset="0"/>
-                    <a:ea typeface="Cambria Math" panose="02040503050406030204" pitchFamily="18" charset="0"/>
-                  </a:rPr>
-                  <a:t>a</a:t>
-                </a:r>
-                <a14:m>
-                  <m:oMath xmlns:m="http://schemas.openxmlformats.org/officeDocument/2006/math">
-                    <m:r>
-                      <a:rPr lang="es-MX" sz="900">
-                        <a:solidFill>
-                          <a:schemeClr val="dk1"/>
-                        </a:solidFill>
-                        <a:latin typeface="+mn-lt"/>
-                        <a:ea typeface="Cambria Math" panose="02040503050406030204" pitchFamily="18" charset="0"/>
-                      </a:rPr>
-                      <m:t>𝑡</m:t>
-                    </m:r>
-                    <m:r>
-                      <a:rPr lang="es-MX" sz="900">
-                        <a:solidFill>
-                          <a:schemeClr val="dk1"/>
-                        </a:solidFill>
-                        <a:latin typeface="+mn-lt"/>
-                        <a:ea typeface="Cambria Math" panose="02040503050406030204" pitchFamily="18" charset="0"/>
-                      </a:rPr>
-                      <m:t>−</m:t>
-                    </m:r>
-                    <m:r>
-                      <a:rPr lang="es-MX" sz="900">
-                        <a:solidFill>
-                          <a:schemeClr val="dk1"/>
-                        </a:solidFill>
-                        <a:latin typeface="+mn-lt"/>
-                        <a:ea typeface="Cambria Math" panose="02040503050406030204" pitchFamily="18" charset="0"/>
-                      </a:rPr>
-                      <m:t>𝑠</m:t>
-                    </m:r>
-                    <m:r>
-                      <a:rPr lang="es-MX" sz="900">
-                        <a:solidFill>
-                          <a:schemeClr val="dk1"/>
-                        </a:solidFill>
-                        <a:latin typeface="+mn-lt"/>
-                        <a:ea typeface="Cambria Math" panose="02040503050406030204" pitchFamily="18" charset="0"/>
-                      </a:rPr>
-                      <m:t>:</m:t>
-                    </m:r>
-                    <m:r>
-                      <m:rPr>
-                        <m:nor/>
-                      </m:rPr>
-                      <a:rPr lang="es-MX" sz="900">
-                        <a:solidFill>
-                          <a:schemeClr val="dk1"/>
-                        </a:solidFill>
-                        <a:latin typeface="+mn-lt"/>
-                        <a:ea typeface="Cambria Math" panose="02040503050406030204" pitchFamily="18" charset="0"/>
-                      </a:rPr>
-                      <m:t> </m:t>
-                    </m:r>
-                    <m:r>
-                      <m:rPr>
-                        <m:nor/>
-                      </m:rPr>
-                      <a:rPr lang="es-MX" sz="900" dirty="0">
-                        <a:solidFill>
-                          <a:schemeClr val="dk1"/>
-                        </a:solidFill>
-                        <a:latin typeface="+mn-lt"/>
-                        <a:ea typeface="Cambria Math" panose="02040503050406030204" pitchFamily="18" charset="0"/>
-                      </a:rPr>
-                      <m:t>Errores</m:t>
-                    </m:r>
-                    <m:r>
-                      <m:rPr>
-                        <m:nor/>
-                      </m:rPr>
-                      <a:rPr lang="es-MX" sz="900" dirty="0">
-                        <a:solidFill>
-                          <a:schemeClr val="dk1"/>
-                        </a:solidFill>
-                        <a:latin typeface="+mn-lt"/>
-                        <a:ea typeface="Cambria Math" panose="02040503050406030204" pitchFamily="18" charset="0"/>
-                      </a:rPr>
-                      <m:t> </m:t>
-                    </m:r>
-                    <m:r>
-                      <m:rPr>
-                        <m:nor/>
-                      </m:rPr>
-                      <a:rPr lang="es-MX" sz="900" dirty="0">
-                        <a:solidFill>
-                          <a:schemeClr val="dk1"/>
-                        </a:solidFill>
-                        <a:latin typeface="+mn-lt"/>
-                        <a:ea typeface="Cambria Math" panose="02040503050406030204" pitchFamily="18" charset="0"/>
-                      </a:rPr>
-                      <m:t>de</m:t>
-                    </m:r>
-                    <m:r>
-                      <m:rPr>
-                        <m:nor/>
-                      </m:rPr>
-                      <a:rPr lang="es-MX" sz="900" dirty="0">
-                        <a:solidFill>
-                          <a:schemeClr val="dk1"/>
-                        </a:solidFill>
-                        <a:latin typeface="+mn-lt"/>
-                        <a:ea typeface="Cambria Math" panose="02040503050406030204" pitchFamily="18" charset="0"/>
-                      </a:rPr>
-                      <m:t> </m:t>
-                    </m:r>
-                    <m:r>
-                      <m:rPr>
-                        <m:nor/>
-                      </m:rPr>
-                      <a:rPr lang="es-MX" sz="900" dirty="0">
-                        <a:solidFill>
-                          <a:schemeClr val="dk1"/>
-                        </a:solidFill>
-                        <a:latin typeface="+mn-lt"/>
-                        <a:ea typeface="Cambria Math" panose="02040503050406030204" pitchFamily="18" charset="0"/>
-                      </a:rPr>
-                      <m:t>la</m:t>
-                    </m:r>
-                    <m:r>
-                      <m:rPr>
-                        <m:nor/>
-                      </m:rPr>
-                      <a:rPr lang="es-MX" sz="900" dirty="0">
-                        <a:solidFill>
-                          <a:schemeClr val="dk1"/>
-                        </a:solidFill>
-                        <a:latin typeface="+mn-lt"/>
-                        <a:ea typeface="Cambria Math" panose="02040503050406030204" pitchFamily="18" charset="0"/>
-                      </a:rPr>
-                      <m:t> </m:t>
-                    </m:r>
-                    <m:r>
-                      <m:rPr>
-                        <m:nor/>
-                      </m:rPr>
-                      <a:rPr lang="es-MX" sz="900" dirty="0">
-                        <a:solidFill>
-                          <a:schemeClr val="dk1"/>
-                        </a:solidFill>
-                        <a:latin typeface="+mn-lt"/>
-                        <a:ea typeface="Cambria Math" panose="02040503050406030204" pitchFamily="18" charset="0"/>
-                      </a:rPr>
-                      <m:t>variable</m:t>
-                    </m:r>
-                    <m:r>
-                      <m:rPr>
-                        <m:nor/>
-                      </m:rPr>
-                      <a:rPr lang="es-MX" sz="900" dirty="0">
-                        <a:solidFill>
-                          <a:schemeClr val="dk1"/>
-                        </a:solidFill>
-                        <a:latin typeface="+mn-lt"/>
-                        <a:ea typeface="Cambria Math" panose="02040503050406030204" pitchFamily="18" charset="0"/>
-                      </a:rPr>
-                      <m:t> </m:t>
-                    </m:r>
-                    <m:r>
-                      <m:rPr>
-                        <m:nor/>
-                      </m:rPr>
-                      <a:rPr lang="es-MX" sz="900" dirty="0">
-                        <a:solidFill>
-                          <a:schemeClr val="dk1"/>
-                        </a:solidFill>
-                        <a:latin typeface="+mn-lt"/>
-                        <a:ea typeface="Cambria Math" panose="02040503050406030204" pitchFamily="18" charset="0"/>
-                      </a:rPr>
-                      <m:t>y</m:t>
-                    </m:r>
-                    <m:r>
-                      <m:rPr>
-                        <m:nor/>
-                      </m:rPr>
-                      <a:rPr lang="es-MX" sz="900" dirty="0">
-                        <a:solidFill>
-                          <a:schemeClr val="dk1"/>
-                        </a:solidFill>
-                        <a:latin typeface="+mn-lt"/>
-                        <a:ea typeface="Cambria Math" panose="02040503050406030204" pitchFamily="18" charset="0"/>
-                      </a:rPr>
-                      <m:t> </m:t>
-                    </m:r>
-                    <m:r>
-                      <m:rPr>
-                        <m:nor/>
-                      </m:rPr>
-                      <a:rPr lang="es-MX" sz="900" dirty="0">
-                        <a:solidFill>
-                          <a:schemeClr val="dk1"/>
-                        </a:solidFill>
-                        <a:latin typeface="+mn-lt"/>
-                        <a:ea typeface="Cambria Math" panose="02040503050406030204" pitchFamily="18" charset="0"/>
-                      </a:rPr>
-                      <m:t>a</m:t>
-                    </m:r>
-                    <m:r>
-                      <m:rPr>
-                        <m:nor/>
-                      </m:rPr>
-                      <a:rPr lang="es-MX" sz="900" dirty="0">
-                        <a:solidFill>
-                          <a:schemeClr val="dk1"/>
-                        </a:solidFill>
-                        <a:latin typeface="+mn-lt"/>
-                        <a:ea typeface="Cambria Math" panose="02040503050406030204" pitchFamily="18" charset="0"/>
-                      </a:rPr>
-                      <m:t> </m:t>
-                    </m:r>
-                    <m:r>
-                      <m:rPr>
-                        <m:nor/>
-                      </m:rPr>
-                      <a:rPr lang="es-MX" sz="900" dirty="0">
-                        <a:solidFill>
-                          <a:schemeClr val="dk1"/>
-                        </a:solidFill>
-                        <a:latin typeface="+mn-lt"/>
-                        <a:ea typeface="Cambria Math" panose="02040503050406030204" pitchFamily="18" charset="0"/>
-                      </a:rPr>
-                      <m:t>t</m:t>
-                    </m:r>
-                    <m:r>
-                      <m:rPr>
-                        <m:nor/>
-                      </m:rPr>
-                      <a:rPr lang="es-MX" sz="900" dirty="0">
-                        <a:solidFill>
-                          <a:schemeClr val="dk1"/>
-                        </a:solidFill>
-                        <a:latin typeface="+mn-lt"/>
-                        <a:ea typeface="Cambria Math" panose="02040503050406030204" pitchFamily="18" charset="0"/>
-                      </a:rPr>
-                      <m:t>−</m:t>
-                    </m:r>
-                    <m:r>
-                      <m:rPr>
-                        <m:nor/>
-                      </m:rPr>
-                      <a:rPr lang="es-MX" sz="900" dirty="0">
-                        <a:solidFill>
-                          <a:schemeClr val="dk1"/>
-                        </a:solidFill>
-                        <a:latin typeface="+mn-lt"/>
-                        <a:ea typeface="Cambria Math" panose="02040503050406030204" pitchFamily="18" charset="0"/>
-                      </a:rPr>
-                      <m:t>s</m:t>
-                    </m:r>
-                  </m:oMath>
-                </a14:m>
-                <a:endParaRPr lang="en-US" sz="900" dirty="0">
-                  <a:solidFill>
-                    <a:schemeClr val="dk1"/>
-                  </a:solidFill>
-                  <a:latin typeface="+mn-lt"/>
-                  <a:ea typeface="Cambria Math" panose="02040503050406030204" pitchFamily="18" charset="0"/>
-                </a:endParaRPr>
-              </a:p>
-              <a:p>
-                <a:pPr lvl="0">
-                  <a:lnSpc>
-                    <a:spcPct val="95000"/>
-                  </a:lnSpc>
-                  <a:buClr>
-                    <a:schemeClr val="dk1"/>
-                  </a:buClr>
-                  <a:buSzPts val="1200"/>
-                </a:pPr>
-                <a:endParaRPr lang="es-MX" sz="1100" dirty="0">
-                  <a:solidFill>
-                    <a:schemeClr val="tx1"/>
-                  </a:solidFill>
-                  <a:latin typeface="+mn-lt"/>
-                </a:endParaRPr>
-              </a:p>
-            </p:txBody>
-          </p:sp>
-        </mc:Choice>
-        <mc:Fallback>
-          <p:sp>
-            <p:nvSpPr>
-              <p:cNvPr id="4" name="Google Shape;89;p1">
-                <a:extLst>
-                  <a:ext uri="{FF2B5EF4-FFF2-40B4-BE49-F238E27FC236}">
-                    <a16:creationId xmlns:a16="http://schemas.microsoft.com/office/drawing/2014/main" id="{A03C1D89-0E0E-5B2B-11E3-9F0758203DB2}"/>
-                  </a:ext>
-                </a:extLst>
-              </p:cNvPr>
-              <p:cNvSpPr txBox="1">
-                <a:spLocks noRot="1" noChangeAspect="1" noMove="1" noResize="1" noEditPoints="1" noAdjustHandles="1" noChangeArrowheads="1" noChangeShapeType="1" noTextEdit="1"/>
-              </p:cNvSpPr>
-              <p:nvPr/>
-            </p:nvSpPr>
-            <p:spPr>
-              <a:xfrm>
-                <a:off x="2834743" y="6468296"/>
-                <a:ext cx="4567044" cy="1002970"/>
-              </a:xfrm>
-              <a:prstGeom prst="rect">
-                <a:avLst/>
-              </a:prstGeom>
-              <a:blipFill>
-                <a:blip r:embed="rId8"/>
-                <a:stretch>
-                  <a:fillRect l="-401" t="-2424"/>
-                </a:stretch>
-              </a:blipFill>
-              <a:ln>
-                <a:noFill/>
-              </a:ln>
-            </p:spPr>
-            <p:txBody>
-              <a:bodyPr/>
-              <a:lstStyle/>
-              <a:p>
-                <a:r>
-                  <a:rPr lang="es-MX">
-                    <a:noFill/>
-                  </a:rPr>
-                  <a:t> </a:t>
-                </a:r>
-              </a:p>
-            </p:txBody>
-          </p:sp>
-        </mc:Fallback>
-      </mc:AlternateContent>
-      <mc:AlternateContent xmlns:mc="http://schemas.openxmlformats.org/markup-compatibility/2006">
-        <mc:Choice xmlns:a14="http://schemas.microsoft.com/office/drawing/2010/main" Requires="a14">
-          <p:sp>
-            <p:nvSpPr>
-              <p:cNvPr id="11" name="TextBox 10">
-                <a:extLst>
-                  <a:ext uri="{FF2B5EF4-FFF2-40B4-BE49-F238E27FC236}">
-                    <a16:creationId xmlns:a16="http://schemas.microsoft.com/office/drawing/2014/main" id="{8C5FBCAC-6DAD-DC5E-D5CD-0AD0CC02BAA7}"/>
-                  </a:ext>
-                </a:extLst>
-              </p:cNvPr>
-              <p:cNvSpPr txBox="1"/>
-              <p:nvPr/>
-            </p:nvSpPr>
-            <p:spPr>
-              <a:xfrm>
-                <a:off x="990052" y="5105253"/>
-                <a:ext cx="4886960" cy="896399"/>
-              </a:xfrm>
-              <a:prstGeom prst="rect">
-                <a:avLst/>
-              </a:prstGeom>
-              <a:noFill/>
-            </p:spPr>
-            <p:txBody>
-              <a:bodyPr wrap="square">
-                <a:spAutoFit/>
-              </a:bodyPr>
-              <a:lstStyle/>
-              <a:p>
-                <a:pPr lvl="0" algn="ctr">
-                  <a:lnSpc>
-                    <a:spcPct val="95000"/>
-                  </a:lnSpc>
-                  <a:buClr>
-                    <a:schemeClr val="dk1"/>
-                  </a:buClr>
-                  <a:buSzPts val="1200"/>
-                </a:pPr>
-                <a:r>
-                  <a:rPr lang="en-US" sz="1000" dirty="0">
-                    <a:solidFill>
-                      <a:schemeClr val="dk1"/>
-                    </a:solidFill>
-                    <a:latin typeface="+mn-lt"/>
-                    <a:ea typeface="Encode Sans Thin"/>
-                    <a:cs typeface="Encode Sans Thin"/>
-                    <a:sym typeface="Encode Sans Thin"/>
-                  </a:rPr>
-                  <a:t>y</a:t>
-                </a:r>
-                <a14:m>
-                  <m:oMath xmlns:m="http://schemas.openxmlformats.org/officeDocument/2006/math">
-                    <m:r>
-                      <a:rPr lang="es-MX" sz="1000" b="0" i="0" smtClean="0">
-                        <a:solidFill>
-                          <a:schemeClr val="dk1"/>
-                        </a:solidFill>
-                        <a:latin typeface="Cambria Math" panose="02040503050406030204" pitchFamily="18" charset="0"/>
-                        <a:ea typeface="Encode Sans Thin"/>
-                        <a:cs typeface="Encode Sans Thin"/>
-                        <a:sym typeface="Encode Sans Thin"/>
-                      </a:rPr>
-                      <m:t>(</m:t>
-                    </m:r>
-                    <m:r>
-                      <m:rPr>
-                        <m:sty m:val="p"/>
-                      </m:rPr>
-                      <a:rPr lang="el-GR" sz="1000" i="1">
-                        <a:solidFill>
-                          <a:schemeClr val="dk1"/>
-                        </a:solidFill>
-                        <a:latin typeface="Cambria Math" panose="02040503050406030204" pitchFamily="18" charset="0"/>
-                        <a:ea typeface="Encode Sans Thin"/>
-                        <a:cs typeface="Encode Sans Thin"/>
-                        <a:sym typeface="Encode Sans Thin"/>
-                      </a:rPr>
-                      <m:t>η</m:t>
-                    </m:r>
-                    <m:r>
-                      <a:rPr lang="es-MX" sz="1000" b="0" i="0" smtClean="0">
-                        <a:solidFill>
-                          <a:schemeClr val="dk1"/>
-                        </a:solidFill>
-                        <a:latin typeface="Cambria Math" panose="02040503050406030204" pitchFamily="18" charset="0"/>
-                        <a:ea typeface="Encode Sans Thin"/>
-                        <a:cs typeface="Encode Sans Thin"/>
-                        <a:sym typeface="Encode Sans Thin"/>
-                      </a:rPr>
-                      <m:t>)</m:t>
-                    </m:r>
-                    <m:r>
-                      <a:rPr lang="es-MX" sz="1000" b="0" i="0" smtClean="0">
-                        <a:solidFill>
-                          <a:schemeClr val="dk1"/>
-                        </a:solidFill>
-                        <a:latin typeface="Cambria Math" panose="02040503050406030204" pitchFamily="18" charset="0"/>
-                        <a:ea typeface="Encode Sans Thin"/>
-                        <a:cs typeface="Encode Sans Thin"/>
-                        <a:sym typeface="Encode Sans Thin"/>
-                      </a:rPr>
-                      <m:t> </m:t>
-                    </m:r>
-                    <m:r>
-                      <a:rPr lang="en-US" sz="1000" i="1" smtClean="0">
-                        <a:solidFill>
-                          <a:schemeClr val="dk1"/>
-                        </a:solidFill>
-                        <a:latin typeface="Cambria Math" panose="02040503050406030204" pitchFamily="18" charset="0"/>
-                        <a:ea typeface="Encode Sans Thin"/>
-                        <a:cs typeface="Encode Sans Thin"/>
-                        <a:sym typeface="Encode Sans Thin"/>
-                      </a:rPr>
-                      <m:t>=</m:t>
-                    </m:r>
-                    <m:r>
-                      <a:rPr lang="en-US" sz="1000" i="1" smtClean="0">
-                        <a:solidFill>
-                          <a:schemeClr val="dk1"/>
-                        </a:solidFill>
-                        <a:latin typeface="Cambria Math" panose="02040503050406030204" pitchFamily="18" charset="0"/>
-                        <a:ea typeface="Encode Sans Thin"/>
-                        <a:cs typeface="Encode Sans Thin"/>
-                        <a:sym typeface="Encode Sans Thin"/>
-                      </a:rPr>
-                      <m:t>𝛽</m:t>
-                    </m:r>
-                    <m:r>
-                      <a:rPr lang="es-MX" sz="1000" b="0" i="1" smtClean="0">
-                        <a:solidFill>
-                          <a:schemeClr val="dk1"/>
-                        </a:solidFill>
-                        <a:latin typeface="Cambria Math" panose="02040503050406030204" pitchFamily="18" charset="0"/>
-                        <a:ea typeface="Encode Sans Thin"/>
-                        <a:cs typeface="Encode Sans Thin"/>
-                        <a:sym typeface="Encode Sans Thin"/>
-                      </a:rPr>
-                      <m:t>0+</m:t>
-                    </m:r>
-                    <m:r>
-                      <m:rPr>
-                        <m:sty m:val="p"/>
-                      </m:rPr>
-                      <a:rPr lang="el-GR" sz="1000" i="1">
-                        <a:solidFill>
-                          <a:schemeClr val="dk1"/>
-                        </a:solidFill>
-                        <a:latin typeface="Cambria Math" panose="02040503050406030204" pitchFamily="18" charset="0"/>
-                        <a:ea typeface="Encode Sans Thin"/>
-                        <a:cs typeface="Encode Sans Thin"/>
-                        <a:sym typeface="Encode Sans Thin"/>
-                      </a:rPr>
-                      <m:t>η</m:t>
-                    </m:r>
-                    <m:r>
-                      <a:rPr lang="en-US" sz="1000" i="1">
-                        <a:solidFill>
-                          <a:schemeClr val="dk1"/>
-                        </a:solidFill>
-                        <a:latin typeface="Cambria Math" panose="02040503050406030204" pitchFamily="18" charset="0"/>
-                        <a:ea typeface="Encode Sans Thin"/>
-                        <a:cs typeface="Encode Sans Thin"/>
-                        <a:sym typeface="Encode Sans Thin"/>
-                      </a:rPr>
-                      <m:t>𝛽</m:t>
-                    </m:r>
-                    <m:r>
-                      <a:rPr lang="es-MX" sz="1000" b="0" i="1" smtClean="0">
-                        <a:solidFill>
-                          <a:schemeClr val="dk1"/>
-                        </a:solidFill>
-                        <a:latin typeface="Cambria Math" panose="02040503050406030204" pitchFamily="18" charset="0"/>
-                        <a:ea typeface="Encode Sans Thin"/>
-                        <a:cs typeface="Encode Sans Thin"/>
-                        <a:sym typeface="Encode Sans Thin"/>
-                      </a:rPr>
-                      <m:t>1 ∗</m:t>
-                    </m:r>
-                    <m:r>
-                      <a:rPr lang="es-MX" sz="1000" b="0" i="1" smtClean="0">
-                        <a:solidFill>
-                          <a:schemeClr val="dk1"/>
-                        </a:solidFill>
-                        <a:latin typeface="Cambria Math" panose="02040503050406030204" pitchFamily="18" charset="0"/>
-                        <a:ea typeface="Encode Sans Thin"/>
-                        <a:cs typeface="Encode Sans Thin"/>
-                        <a:sym typeface="Encode Sans Thin"/>
-                      </a:rPr>
-                      <m:t>𝑥</m:t>
-                    </m:r>
-                    <m:r>
-                      <a:rPr lang="es-MX" sz="1000" b="0" i="1" smtClean="0">
-                        <a:solidFill>
-                          <a:schemeClr val="dk1"/>
-                        </a:solidFill>
-                        <a:latin typeface="Cambria Math" panose="02040503050406030204" pitchFamily="18" charset="0"/>
-                        <a:ea typeface="Encode Sans Thin"/>
-                        <a:cs typeface="Encode Sans Thin"/>
-                        <a:sym typeface="Encode Sans Thin"/>
-                      </a:rPr>
-                      <m:t>1+</m:t>
-                    </m:r>
-                    <m:r>
-                      <m:rPr>
-                        <m:sty m:val="p"/>
-                      </m:rPr>
-                      <a:rPr lang="el-GR" sz="1000" i="1">
-                        <a:solidFill>
-                          <a:schemeClr val="dk1"/>
-                        </a:solidFill>
-                        <a:latin typeface="Cambria Math" panose="02040503050406030204" pitchFamily="18" charset="0"/>
-                        <a:ea typeface="Encode Sans Thin"/>
-                        <a:cs typeface="Encode Sans Thin"/>
-                        <a:sym typeface="Encode Sans Thin"/>
-                      </a:rPr>
-                      <m:t>η</m:t>
-                    </m:r>
-                    <m:r>
-                      <a:rPr lang="en-US" sz="1000" i="1">
-                        <a:solidFill>
-                          <a:schemeClr val="dk1"/>
-                        </a:solidFill>
-                        <a:latin typeface="Cambria Math" panose="02040503050406030204" pitchFamily="18" charset="0"/>
-                        <a:ea typeface="Encode Sans Thin"/>
-                        <a:cs typeface="Encode Sans Thin"/>
-                        <a:sym typeface="Encode Sans Thin"/>
-                      </a:rPr>
-                      <m:t>𝛽</m:t>
-                    </m:r>
-                    <m:r>
-                      <a:rPr lang="es-MX" sz="1000" b="0" i="1" smtClean="0">
-                        <a:solidFill>
-                          <a:schemeClr val="dk1"/>
-                        </a:solidFill>
-                        <a:latin typeface="Cambria Math" panose="02040503050406030204" pitchFamily="18" charset="0"/>
-                        <a:ea typeface="Encode Sans Thin"/>
-                        <a:cs typeface="Encode Sans Thin"/>
-                        <a:sym typeface="Encode Sans Thin"/>
-                      </a:rPr>
-                      <m:t>2</m:t>
-                    </m:r>
-                    <m:r>
-                      <a:rPr lang="es-MX" sz="1000" i="1">
-                        <a:solidFill>
-                          <a:schemeClr val="dk1"/>
-                        </a:solidFill>
-                        <a:latin typeface="Cambria Math" panose="02040503050406030204" pitchFamily="18" charset="0"/>
-                        <a:ea typeface="Encode Sans Thin"/>
-                        <a:cs typeface="Encode Sans Thin"/>
-                        <a:sym typeface="Encode Sans Thin"/>
-                      </a:rPr>
-                      <m:t> ∗</m:t>
-                    </m:r>
-                    <m:r>
-                      <a:rPr lang="es-MX" sz="1000" i="1">
-                        <a:solidFill>
-                          <a:schemeClr val="dk1"/>
-                        </a:solidFill>
-                        <a:latin typeface="Cambria Math" panose="02040503050406030204" pitchFamily="18" charset="0"/>
-                        <a:ea typeface="Encode Sans Thin"/>
-                        <a:cs typeface="Encode Sans Thin"/>
-                        <a:sym typeface="Encode Sans Thin"/>
-                      </a:rPr>
-                      <m:t>𝑥</m:t>
-                    </m:r>
-                    <m:r>
-                      <a:rPr lang="es-MX" sz="1000" b="0" i="1" smtClean="0">
-                        <a:solidFill>
-                          <a:schemeClr val="dk1"/>
-                        </a:solidFill>
-                        <a:latin typeface="Cambria Math" panose="02040503050406030204" pitchFamily="18" charset="0"/>
-                        <a:ea typeface="Encode Sans Thin"/>
-                        <a:cs typeface="Encode Sans Thin"/>
-                        <a:sym typeface="Encode Sans Thin"/>
-                      </a:rPr>
-                      <m:t>2+ …</m:t>
-                    </m:r>
-                    <m:r>
-                      <a:rPr lang="es-MX" sz="1000" i="1">
-                        <a:solidFill>
-                          <a:schemeClr val="dk1"/>
-                        </a:solidFill>
-                        <a:latin typeface="Cambria Math" panose="02040503050406030204" pitchFamily="18" charset="0"/>
-                        <a:ea typeface="Encode Sans Thin"/>
-                        <a:cs typeface="Encode Sans Thin"/>
-                        <a:sym typeface="Encode Sans Thin"/>
-                      </a:rPr>
-                      <m:t>+</m:t>
-                    </m:r>
-                    <m:r>
-                      <m:rPr>
-                        <m:sty m:val="p"/>
-                      </m:rPr>
-                      <a:rPr lang="el-GR" sz="1000" i="1">
-                        <a:solidFill>
-                          <a:schemeClr val="dk1"/>
-                        </a:solidFill>
-                        <a:latin typeface="Cambria Math" panose="02040503050406030204" pitchFamily="18" charset="0"/>
-                        <a:ea typeface="Encode Sans Thin"/>
-                        <a:cs typeface="Encode Sans Thin"/>
-                        <a:sym typeface="Encode Sans Thin"/>
-                      </a:rPr>
-                      <m:t>η</m:t>
-                    </m:r>
-                    <m:r>
-                      <a:rPr lang="en-US" sz="1000" i="1">
-                        <a:solidFill>
-                          <a:schemeClr val="dk1"/>
-                        </a:solidFill>
-                        <a:latin typeface="Cambria Math" panose="02040503050406030204" pitchFamily="18" charset="0"/>
-                        <a:ea typeface="Encode Sans Thin"/>
-                        <a:cs typeface="Encode Sans Thin"/>
-                        <a:sym typeface="Encode Sans Thin"/>
-                      </a:rPr>
-                      <m:t>𝛽</m:t>
-                    </m:r>
-                    <m:r>
-                      <a:rPr lang="es-MX" sz="1000" b="0" i="1" smtClean="0">
-                        <a:solidFill>
-                          <a:schemeClr val="dk1"/>
-                        </a:solidFill>
-                        <a:latin typeface="Cambria Math" panose="02040503050406030204" pitchFamily="18" charset="0"/>
-                        <a:ea typeface="Encode Sans Thin"/>
-                        <a:cs typeface="Encode Sans Thin"/>
-                        <a:sym typeface="Encode Sans Thin"/>
-                      </a:rPr>
-                      <m:t>𝑛</m:t>
-                    </m:r>
-                    <m:r>
-                      <a:rPr lang="es-MX" sz="1000" i="1">
-                        <a:solidFill>
-                          <a:schemeClr val="dk1"/>
-                        </a:solidFill>
-                        <a:latin typeface="Cambria Math" panose="02040503050406030204" pitchFamily="18" charset="0"/>
-                        <a:ea typeface="Encode Sans Thin"/>
-                        <a:cs typeface="Encode Sans Thin"/>
-                        <a:sym typeface="Encode Sans Thin"/>
-                      </a:rPr>
-                      <m:t>∗</m:t>
-                    </m:r>
-                    <m:r>
-                      <a:rPr lang="es-MX" sz="1000" i="1">
-                        <a:solidFill>
-                          <a:schemeClr val="dk1"/>
-                        </a:solidFill>
-                        <a:latin typeface="Cambria Math" panose="02040503050406030204" pitchFamily="18" charset="0"/>
-                        <a:ea typeface="Encode Sans Thin"/>
-                        <a:cs typeface="Encode Sans Thin"/>
-                        <a:sym typeface="Encode Sans Thin"/>
-                      </a:rPr>
-                      <m:t>𝑥𝑛</m:t>
-                    </m:r>
-                  </m:oMath>
-                </a14:m>
-                <a:endParaRPr lang="es-MX" sz="1000" b="0" dirty="0">
-                  <a:solidFill>
-                    <a:schemeClr val="dk1"/>
-                  </a:solidFill>
-                  <a:latin typeface="+mn-lt"/>
-                  <a:ea typeface="Encode Sans Thin"/>
-                  <a:cs typeface="Encode Sans Thin"/>
-                  <a:sym typeface="Encode Sans Thin"/>
-                </a:endParaRPr>
-              </a:p>
-              <a:p>
-                <a:pPr lvl="0">
-                  <a:lnSpc>
-                    <a:spcPct val="95000"/>
-                  </a:lnSpc>
-                  <a:buClr>
-                    <a:schemeClr val="dk1"/>
-                  </a:buClr>
-                  <a:buSzPts val="1200"/>
-                </a:pPr>
-                <a:r>
-                  <a:rPr lang="es-MX" sz="900" dirty="0">
-                    <a:solidFill>
-                      <a:schemeClr val="dk1"/>
-                    </a:solidFill>
-                    <a:latin typeface="+mn-lt"/>
-                  </a:rPr>
-                  <a:t>Donde: </a:t>
-                </a:r>
-              </a:p>
-              <a:p>
-                <a:pPr lvl="0">
-                  <a:lnSpc>
-                    <a:spcPct val="95000"/>
-                  </a:lnSpc>
-                  <a:buClr>
-                    <a:schemeClr val="dk1"/>
-                  </a:buClr>
-                  <a:buSzPts val="1200"/>
-                </a:pPr>
-                <a:r>
-                  <a:rPr lang="es-MX" sz="900" dirty="0">
-                    <a:solidFill>
-                      <a:schemeClr val="dk1"/>
-                    </a:solidFill>
-                    <a:latin typeface="+mn-lt"/>
-                  </a:rPr>
-                  <a:t>y: Valor a pronosticar de variable dependiente y </a:t>
-                </a:r>
-              </a:p>
-              <a:p>
-                <a:pPr lvl="0">
-                  <a:lnSpc>
-                    <a:spcPct val="95000"/>
-                  </a:lnSpc>
-                  <a:buClr>
-                    <a:schemeClr val="dk1"/>
-                  </a:buClr>
-                  <a:buSzPts val="1200"/>
-                </a:pPr>
-                <a:r>
-                  <a:rPr lang="es-MX" sz="900" b="0" i="0" dirty="0">
-                    <a:solidFill>
-                      <a:schemeClr val="dk1"/>
-                    </a:solidFill>
-                    <a:latin typeface="+mn-lt"/>
-                    <a:ea typeface="Cambria Math" panose="02040503050406030204" pitchFamily="18" charset="0"/>
-                    <a:sym typeface="Arial"/>
-                  </a:rPr>
-                  <a:t>𝛽: Parámetros a ajustar para cada caso </a:t>
-                </a:r>
-              </a:p>
-              <a:p>
-                <a:pPr lvl="0">
-                  <a:lnSpc>
-                    <a:spcPct val="95000"/>
-                  </a:lnSpc>
-                  <a:buClr>
-                    <a:schemeClr val="dk1"/>
-                  </a:buClr>
-                  <a:buSzPts val="1200"/>
-                </a:pPr>
-                <a:r>
-                  <a:rPr lang="es-MX" sz="900" b="0" i="0" dirty="0">
-                    <a:solidFill>
-                      <a:schemeClr val="dk1"/>
-                    </a:solidFill>
-                    <a:latin typeface="+mn-lt"/>
-                    <a:ea typeface="Cambria Math" panose="02040503050406030204" pitchFamily="18" charset="0"/>
-                    <a:sym typeface="Arial"/>
-                  </a:rPr>
-                  <a:t>Xi: variables predictoras independientes entre si</a:t>
-                </a:r>
-              </a:p>
-              <a:p>
-                <a:pPr lvl="0">
-                  <a:lnSpc>
-                    <a:spcPct val="95000"/>
-                  </a:lnSpc>
-                  <a:buClr>
-                    <a:schemeClr val="dk1"/>
-                  </a:buClr>
-                  <a:buSzPts val="1200"/>
-                </a:pPr>
-                <a14:m>
-                  <m:oMath xmlns:m="http://schemas.openxmlformats.org/officeDocument/2006/math">
-                    <m:r>
-                      <m:rPr>
-                        <m:sty m:val="p"/>
-                      </m:rPr>
-                      <a:rPr lang="el-GR" sz="900" i="1" smtClean="0">
-                        <a:solidFill>
-                          <a:schemeClr val="dk1"/>
-                        </a:solidFill>
-                        <a:latin typeface="Cambria Math" panose="02040503050406030204" pitchFamily="18" charset="0"/>
-                        <a:ea typeface="Encode Sans Thin"/>
-                        <a:cs typeface="Encode Sans Thin"/>
-                        <a:sym typeface="Encode Sans Thin"/>
-                      </a:rPr>
-                      <m:t>η</m:t>
-                    </m:r>
-                    <m:r>
-                      <a:rPr lang="el-GR" sz="900" i="1" smtClean="0">
-                        <a:solidFill>
-                          <a:schemeClr val="dk1"/>
-                        </a:solidFill>
-                        <a:latin typeface="Cambria Math" panose="02040503050406030204" pitchFamily="18" charset="0"/>
-                        <a:ea typeface="Encode Sans Thin"/>
-                        <a:cs typeface="Encode Sans Thin"/>
-                        <a:sym typeface="Encode Sans Thin"/>
-                      </a:rPr>
-                      <m:t> </m:t>
-                    </m:r>
-                  </m:oMath>
-                </a14:m>
-                <a:r>
-                  <a:rPr lang="es-MX" sz="900" dirty="0">
-                    <a:solidFill>
-                      <a:schemeClr val="dk1"/>
-                    </a:solidFill>
-                    <a:latin typeface="+mn-lt"/>
-                    <a:ea typeface="Cambria Math" panose="02040503050406030204" pitchFamily="18" charset="0"/>
-                  </a:rPr>
-                  <a:t> n o gama: Función Link (para el caso de funciones no simples )</a:t>
-                </a:r>
-                <a:endParaRPr lang="es-MX" sz="900" b="0" i="0" dirty="0">
-                  <a:solidFill>
-                    <a:schemeClr val="dk1"/>
-                  </a:solidFill>
-                  <a:latin typeface="+mn-lt"/>
-                  <a:ea typeface="Cambria Math" panose="02040503050406030204" pitchFamily="18" charset="0"/>
-                  <a:sym typeface="Arial"/>
-                </a:endParaRPr>
-              </a:p>
-            </p:txBody>
-          </p:sp>
-        </mc:Choice>
-        <mc:Fallback>
-          <p:sp>
-            <p:nvSpPr>
-              <p:cNvPr id="11" name="TextBox 10">
-                <a:extLst>
-                  <a:ext uri="{FF2B5EF4-FFF2-40B4-BE49-F238E27FC236}">
-                    <a16:creationId xmlns:a16="http://schemas.microsoft.com/office/drawing/2014/main" id="{8C5FBCAC-6DAD-DC5E-D5CD-0AD0CC02BAA7}"/>
-                  </a:ext>
-                </a:extLst>
-              </p:cNvPr>
-              <p:cNvSpPr txBox="1">
-                <a:spLocks noRot="1" noChangeAspect="1" noMove="1" noResize="1" noEditPoints="1" noAdjustHandles="1" noChangeArrowheads="1" noChangeShapeType="1" noTextEdit="1"/>
-              </p:cNvSpPr>
-              <p:nvPr/>
-            </p:nvSpPr>
-            <p:spPr>
-              <a:xfrm>
-                <a:off x="990052" y="5105253"/>
-                <a:ext cx="4886960" cy="896399"/>
-              </a:xfrm>
-              <a:prstGeom prst="rect">
-                <a:avLst/>
-              </a:prstGeom>
-              <a:blipFill>
-                <a:blip r:embed="rId9"/>
-                <a:stretch>
-                  <a:fillRect t="-676" b="-1351"/>
-                </a:stretch>
-              </a:blipFill>
-            </p:spPr>
-            <p:txBody>
-              <a:bodyPr/>
-              <a:lstStyle/>
-              <a:p>
-                <a:r>
-                  <a:rPr lang="es-MX">
-                    <a:noFill/>
-                  </a:rPr>
-                  <a:t> </a:t>
-                </a:r>
-              </a:p>
-            </p:txBody>
-          </p:sp>
-        </mc:Fallback>
-      </mc:AlternateContent>
       <p:graphicFrame>
         <p:nvGraphicFramePr>
           <p:cNvPr id="21" name="Table 20">
@@ -19112,7 +17664,7 @@
           <p:nvPr/>
         </p:nvPicPr>
         <p:blipFill>
-          <a:blip r:embed="rId10"/>
+          <a:blip r:embed="rId8"/>
           <a:stretch>
             <a:fillRect/>
           </a:stretch>
@@ -19971,7 +18523,7 @@
           <p:nvPr/>
         </p:nvPicPr>
         <p:blipFill>
-          <a:blip r:embed="rId11"/>
+          <a:blip r:embed="rId9"/>
           <a:stretch>
             <a:fillRect/>
           </a:stretch>
@@ -20001,7 +18553,7 @@
           <p:nvPr/>
         </p:nvPicPr>
         <p:blipFill>
-          <a:blip r:embed="rId12"/>
+          <a:blip r:embed="rId10"/>
           <a:stretch>
             <a:fillRect/>
           </a:stretch>
@@ -20976,12 +19528,1412 @@
           </a:graphicData>
         </a:graphic>
       </p:graphicFrame>
+      <p:sp>
+        <p:nvSpPr>
+          <p:cNvPr id="28" name="Google Shape;97;p1">
+            <a:extLst>
+              <a:ext uri="{FF2B5EF4-FFF2-40B4-BE49-F238E27FC236}">
+                <a16:creationId xmlns:a16="http://schemas.microsoft.com/office/drawing/2014/main" id="{AA9F2FE4-A7CA-97E3-7273-C75D57FDD65D}"/>
+              </a:ext>
+            </a:extLst>
+          </p:cNvPr>
+          <p:cNvSpPr txBox="1"/>
+          <p:nvPr/>
+        </p:nvSpPr>
+        <p:spPr>
+          <a:xfrm>
+            <a:off x="760900" y="5710632"/>
+            <a:ext cx="5486400" cy="400200"/>
+          </a:xfrm>
+          <a:prstGeom prst="rect">
+            <a:avLst/>
+          </a:prstGeom>
+          <a:noFill/>
+          <a:ln>
+            <a:noFill/>
+          </a:ln>
+        </p:spPr>
+        <p:txBody>
+          <a:bodyPr spcFirstLastPara="1" wrap="square" lIns="91425" tIns="91425" rIns="91425" bIns="91425" anchor="t" anchorCtr="0">
+            <a:spAutoFit/>
+          </a:bodyPr>
+          <a:lstStyle/>
+          <a:p>
+            <a:pPr marL="0" lvl="0" indent="0" algn="l" rtl="0">
+              <a:spcBef>
+                <a:spcPts val="0"/>
+              </a:spcBef>
+              <a:spcAft>
+                <a:spcPts val="0"/>
+              </a:spcAft>
+              <a:buNone/>
+            </a:pPr>
+            <a:endParaRPr/>
+          </a:p>
+        </p:txBody>
+      </p:sp>
+      <p:sp>
+        <p:nvSpPr>
+          <p:cNvPr id="29" name="Google Shape;88;p1">
+            <a:extLst>
+              <a:ext uri="{FF2B5EF4-FFF2-40B4-BE49-F238E27FC236}">
+                <a16:creationId xmlns:a16="http://schemas.microsoft.com/office/drawing/2014/main" id="{40C27ABD-299D-F7D2-95F6-C847352586E3}"/>
+              </a:ext>
+            </a:extLst>
+          </p:cNvPr>
+          <p:cNvSpPr/>
+          <p:nvPr/>
+        </p:nvSpPr>
+        <p:spPr>
+          <a:xfrm>
+            <a:off x="356870" y="3867321"/>
+            <a:ext cx="9134090" cy="3431585"/>
+          </a:xfrm>
+          <a:prstGeom prst="roundRect">
+            <a:avLst>
+              <a:gd name="adj" fmla="val 1512"/>
+            </a:avLst>
+          </a:prstGeom>
+          <a:solidFill>
+            <a:schemeClr val="accent5"/>
+          </a:solidFill>
+          <a:ln w="9525" cap="flat" cmpd="sng">
+            <a:solidFill>
+              <a:schemeClr val="dk1"/>
+            </a:solidFill>
+            <a:prstDash val="solid"/>
+            <a:miter lim="800000"/>
+            <a:headEnd type="none" w="sm" len="sm"/>
+            <a:tailEnd type="none" w="sm" len="sm"/>
+          </a:ln>
+        </p:spPr>
+        <p:txBody>
+          <a:bodyPr spcFirstLastPara="1" wrap="square" lIns="91425" tIns="45700" rIns="91425" bIns="45700" anchor="ctr" anchorCtr="0">
+            <a:noAutofit/>
+          </a:bodyPr>
+          <a:lstStyle/>
+          <a:p>
+            <a:pPr lvl="0" algn="ctr">
+              <a:lnSpc>
+                <a:spcPct val="95000"/>
+              </a:lnSpc>
+              <a:buClr>
+                <a:schemeClr val="dk1"/>
+              </a:buClr>
+              <a:buSzPts val="1200"/>
+            </a:pPr>
+            <a:endParaRPr lang="en-US" sz="1000" b="0" i="0" dirty="0">
+              <a:solidFill>
+                <a:schemeClr val="dk1"/>
+              </a:solidFill>
+              <a:latin typeface="+mn-lt"/>
+              <a:ea typeface="Cambria Math" panose="02040503050406030204" pitchFamily="18" charset="0"/>
+              <a:sym typeface="Arial"/>
+            </a:endParaRPr>
+          </a:p>
+        </p:txBody>
+      </p:sp>
+      <p:sp>
+        <p:nvSpPr>
+          <p:cNvPr id="30" name="Google Shape;89;p1">
+            <a:extLst>
+              <a:ext uri="{FF2B5EF4-FFF2-40B4-BE49-F238E27FC236}">
+                <a16:creationId xmlns:a16="http://schemas.microsoft.com/office/drawing/2014/main" id="{B188BC0C-B6F1-FB83-4EC9-AF4E796C039B}"/>
+              </a:ext>
+            </a:extLst>
+          </p:cNvPr>
+          <p:cNvSpPr txBox="1"/>
+          <p:nvPr/>
+        </p:nvSpPr>
+        <p:spPr>
+          <a:xfrm>
+            <a:off x="378293" y="4152333"/>
+            <a:ext cx="8975873" cy="637485"/>
+          </a:xfrm>
+          <a:prstGeom prst="rect">
+            <a:avLst/>
+          </a:prstGeom>
+          <a:noFill/>
+          <a:ln>
+            <a:noFill/>
+          </a:ln>
+        </p:spPr>
+        <p:txBody>
+          <a:bodyPr spcFirstLastPara="1" wrap="square" lIns="52225" tIns="26100" rIns="52225" bIns="26100" anchor="t" anchorCtr="0">
+            <a:spAutoFit/>
+          </a:bodyPr>
+          <a:lstStyle/>
+          <a:p>
+            <a:pPr marL="0" marR="0" lvl="0" indent="0" algn="just" rtl="0">
+              <a:lnSpc>
+                <a:spcPct val="95000"/>
+              </a:lnSpc>
+              <a:spcBef>
+                <a:spcPts val="0"/>
+              </a:spcBef>
+              <a:spcAft>
+                <a:spcPts val="0"/>
+              </a:spcAft>
+              <a:buClr>
+                <a:schemeClr val="dk1"/>
+              </a:buClr>
+              <a:buSzPts val="1200"/>
+              <a:buFont typeface="Times New Roman"/>
+              <a:buNone/>
+            </a:pPr>
+            <a:r>
+              <a:rPr lang="es-MX" sz="1000" dirty="0">
+                <a:solidFill>
+                  <a:schemeClr val="tx1"/>
+                </a:solidFill>
+                <a:latin typeface="+mn-lt"/>
+              </a:rPr>
+              <a:t>La teoría de pronósticos busca determinar el valor más probable de una variable dependiente (Y) en función de variables independientes (x1,x2, x3, etc.) . En este caso se abordarán dos modelos representativos que pretenden resolver este problema, </a:t>
+            </a:r>
+          </a:p>
+          <a:p>
+            <a:pPr marL="0" marR="0" lvl="0" indent="0" algn="just" rtl="0">
+              <a:lnSpc>
+                <a:spcPct val="95000"/>
+              </a:lnSpc>
+              <a:spcBef>
+                <a:spcPts val="0"/>
+              </a:spcBef>
+              <a:spcAft>
+                <a:spcPts val="0"/>
+              </a:spcAft>
+              <a:buClr>
+                <a:schemeClr val="dk1"/>
+              </a:buClr>
+              <a:buSzPts val="1200"/>
+              <a:buFont typeface="Times New Roman"/>
+              <a:buNone/>
+            </a:pPr>
+            <a:r>
+              <a:rPr lang="es-MX" sz="1000" dirty="0">
+                <a:solidFill>
+                  <a:schemeClr val="tx1"/>
+                </a:solidFill>
+                <a:latin typeface="+mn-lt"/>
+              </a:rPr>
+              <a:t>A) El modelo lineal generalizado (GLM, por sus siglas en inglés); en donde una variable de interés (endógena) es explicada por un conjunto de variables explicativas (exógenas).y que tiene la siguiente forma </a:t>
+            </a:r>
+            <a:r>
+              <a:rPr lang="es-MX" sz="1000" baseline="30000" dirty="0">
+                <a:solidFill>
+                  <a:schemeClr val="tx1"/>
+                </a:solidFill>
+                <a:latin typeface="+mn-lt"/>
+              </a:rPr>
+              <a:t>2</a:t>
+            </a:r>
+            <a:r>
+              <a:rPr lang="es-MX" sz="1000" dirty="0">
+                <a:solidFill>
+                  <a:schemeClr val="tx1"/>
+                </a:solidFill>
+                <a:latin typeface="+mn-lt"/>
+              </a:rPr>
+              <a:t>: </a:t>
+            </a:r>
+          </a:p>
+        </p:txBody>
+      </p:sp>
+      <p:sp>
+        <p:nvSpPr>
+          <p:cNvPr id="32" name="Google Shape;89;p1">
+            <a:extLst>
+              <a:ext uri="{FF2B5EF4-FFF2-40B4-BE49-F238E27FC236}">
+                <a16:creationId xmlns:a16="http://schemas.microsoft.com/office/drawing/2014/main" id="{DC4842FB-F914-8951-AF6C-490177779B80}"/>
+              </a:ext>
+            </a:extLst>
+          </p:cNvPr>
+          <p:cNvSpPr txBox="1"/>
+          <p:nvPr/>
+        </p:nvSpPr>
+        <p:spPr>
+          <a:xfrm>
+            <a:off x="378293" y="5693602"/>
+            <a:ext cx="9015465" cy="637485"/>
+          </a:xfrm>
+          <a:prstGeom prst="rect">
+            <a:avLst/>
+          </a:prstGeom>
+          <a:noFill/>
+          <a:ln>
+            <a:noFill/>
+          </a:ln>
+        </p:spPr>
+        <p:txBody>
+          <a:bodyPr spcFirstLastPara="1" wrap="square" lIns="52225" tIns="26100" rIns="52225" bIns="26100" anchor="t" anchorCtr="0">
+            <a:spAutoFit/>
+          </a:bodyPr>
+          <a:lstStyle/>
+          <a:p>
+            <a:pPr marL="0" marR="0" lvl="0" indent="0" algn="just" rtl="0">
+              <a:lnSpc>
+                <a:spcPct val="95000"/>
+              </a:lnSpc>
+              <a:spcBef>
+                <a:spcPts val="0"/>
+              </a:spcBef>
+              <a:spcAft>
+                <a:spcPts val="0"/>
+              </a:spcAft>
+              <a:buClr>
+                <a:schemeClr val="dk1"/>
+              </a:buClr>
+              <a:buSzPts val="1200"/>
+              <a:buFont typeface="Times New Roman"/>
+              <a:buNone/>
+            </a:pPr>
+            <a:r>
+              <a:rPr lang="es-MX" sz="1000" dirty="0">
+                <a:solidFill>
+                  <a:schemeClr val="tx1"/>
+                </a:solidFill>
+                <a:latin typeface="+mn-lt"/>
+              </a:rPr>
+              <a:t>B) Los modelos de series de tiempo donde las variables xi son los valores de la misma variable y, pero a tiempo t-s, donde s es un </a:t>
+            </a:r>
+            <a:r>
+              <a:rPr lang="es-MX" sz="1000" i="1" dirty="0">
+                <a:solidFill>
+                  <a:schemeClr val="tx1"/>
+                </a:solidFill>
+                <a:latin typeface="+mn-lt"/>
+              </a:rPr>
+              <a:t>“</a:t>
+            </a:r>
+            <a:r>
+              <a:rPr lang="es-MX" sz="1000" i="1" dirty="0" err="1">
+                <a:solidFill>
+                  <a:schemeClr val="tx1"/>
+                </a:solidFill>
+                <a:latin typeface="+mn-lt"/>
+              </a:rPr>
+              <a:t>slag</a:t>
+            </a:r>
+            <a:r>
+              <a:rPr lang="es-MX" sz="1000" i="1" dirty="0">
+                <a:solidFill>
+                  <a:schemeClr val="tx1"/>
+                </a:solidFill>
+                <a:latin typeface="+mn-lt"/>
+              </a:rPr>
+              <a:t>” </a:t>
+            </a:r>
+            <a:r>
+              <a:rPr lang="es-MX" sz="1000" dirty="0">
+                <a:solidFill>
+                  <a:schemeClr val="tx1"/>
+                </a:solidFill>
+                <a:latin typeface="+mn-lt"/>
+              </a:rPr>
+              <a:t>o rezago determinado en el tiempo, es decir, se puede entender como una especie de modelos lineales donde los predictores son los valores significativos de la misma variable en el tiempo, más un término de error o “ruido blanco” que da cuenta por la propia aleatoriedad del fenómeno, se pueden modelar mediante procesos llamados Auto-Regresivos y de Medias Móviles (ARIMA) que tiene la siguiente forma </a:t>
+            </a:r>
+          </a:p>
+        </p:txBody>
+      </p:sp>
+      <mc:AlternateContent xmlns:mc="http://schemas.openxmlformats.org/markup-compatibility/2006">
+        <mc:Choice xmlns:a14="http://schemas.microsoft.com/office/drawing/2010/main" Requires="a14">
+          <p:sp>
+            <p:nvSpPr>
+              <p:cNvPr id="33" name="Google Shape;89;p1">
+                <a:extLst>
+                  <a:ext uri="{FF2B5EF4-FFF2-40B4-BE49-F238E27FC236}">
+                    <a16:creationId xmlns:a16="http://schemas.microsoft.com/office/drawing/2014/main" id="{F02E3659-BF49-3676-90D6-AF59E5FC1E8A}"/>
+                  </a:ext>
+                </a:extLst>
+              </p:cNvPr>
+              <p:cNvSpPr txBox="1"/>
+              <p:nvPr/>
+            </p:nvSpPr>
+            <p:spPr>
+              <a:xfrm>
+                <a:off x="3120493" y="6288295"/>
+                <a:ext cx="4567044" cy="1134544"/>
+              </a:xfrm>
+              <a:prstGeom prst="rect">
+                <a:avLst/>
+              </a:prstGeom>
+              <a:noFill/>
+              <a:ln>
+                <a:noFill/>
+              </a:ln>
+            </p:spPr>
+            <p:txBody>
+              <a:bodyPr spcFirstLastPara="1" wrap="square" lIns="52225" tIns="26100" rIns="52225" bIns="26100" anchor="t" anchorCtr="0">
+                <a:spAutoFit/>
+              </a:bodyPr>
+              <a:lstStyle/>
+              <a:p>
+                <a:pPr lvl="0" algn="ctr">
+                  <a:lnSpc>
+                    <a:spcPct val="95000"/>
+                  </a:lnSpc>
+                  <a:buClr>
+                    <a:schemeClr val="dk1"/>
+                  </a:buClr>
+                  <a:buSzPts val="1200"/>
+                </a:pPr>
+                <a:r>
+                  <a:rPr lang="es-MX" sz="900" dirty="0">
+                    <a:solidFill>
+                      <a:schemeClr val="tx1"/>
+                    </a:solidFill>
+                    <a:latin typeface="+mn-lt"/>
+                  </a:rPr>
+                  <a:t>y(t)</a:t>
+                </a:r>
+                <a14:m>
+                  <m:oMath xmlns:m="http://schemas.openxmlformats.org/officeDocument/2006/math">
+                    <m:r>
+                      <a:rPr lang="es-MX" sz="900" i="1" smtClean="0">
+                        <a:solidFill>
+                          <a:schemeClr val="tx1"/>
+                        </a:solidFill>
+                        <a:latin typeface="Cambria Math" panose="02040503050406030204" pitchFamily="18" charset="0"/>
+                      </a:rPr>
+                      <m:t>=</m:t>
+                    </m:r>
+                    <m:r>
+                      <a:rPr lang="es-MX" sz="900" b="0" i="1" smtClean="0">
+                        <a:solidFill>
+                          <a:schemeClr val="tx1"/>
+                        </a:solidFill>
+                        <a:latin typeface="Cambria Math" panose="02040503050406030204" pitchFamily="18" charset="0"/>
+                      </a:rPr>
+                      <m:t>𝑐</m:t>
+                    </m:r>
+                    <m:r>
+                      <a:rPr lang="es-MX" sz="900" b="0" i="1" smtClean="0">
+                        <a:solidFill>
+                          <a:schemeClr val="tx1"/>
+                        </a:solidFill>
+                        <a:latin typeface="Cambria Math" panose="02040503050406030204" pitchFamily="18" charset="0"/>
+                      </a:rPr>
+                      <m:t>+ </m:t>
+                    </m:r>
+                    <m:r>
+                      <a:rPr lang="es-MX" sz="900" b="0" i="1" smtClean="0">
+                        <a:solidFill>
+                          <a:schemeClr val="tx1"/>
+                        </a:solidFill>
+                        <a:latin typeface="Cambria Math" panose="02040503050406030204" pitchFamily="18" charset="0"/>
+                        <a:ea typeface="Cambria Math" panose="02040503050406030204" pitchFamily="18" charset="0"/>
+                      </a:rPr>
+                      <m:t>𝜃</m:t>
+                    </m:r>
+                    <m:r>
+                      <a:rPr lang="es-MX" sz="900" b="0" i="1" smtClean="0">
+                        <a:solidFill>
+                          <a:schemeClr val="tx1"/>
+                        </a:solidFill>
+                        <a:latin typeface="Cambria Math" panose="02040503050406030204" pitchFamily="18" charset="0"/>
+                        <a:ea typeface="Cambria Math" panose="02040503050406030204" pitchFamily="18" charset="0"/>
+                      </a:rPr>
+                      <m:t>1∗</m:t>
+                    </m:r>
+                    <m:r>
+                      <a:rPr lang="es-MX" sz="900" b="0" i="1" smtClean="0">
+                        <a:solidFill>
+                          <a:schemeClr val="tx1"/>
+                        </a:solidFill>
+                        <a:latin typeface="Cambria Math" panose="02040503050406030204" pitchFamily="18" charset="0"/>
+                        <a:ea typeface="Cambria Math" panose="02040503050406030204" pitchFamily="18" charset="0"/>
+                      </a:rPr>
+                      <m:t>𝑋𝑡</m:t>
+                    </m:r>
+                    <m:r>
+                      <a:rPr lang="es-MX" sz="900" b="0" i="1" smtClean="0">
+                        <a:solidFill>
+                          <a:schemeClr val="tx1"/>
+                        </a:solidFill>
+                        <a:latin typeface="Cambria Math" panose="02040503050406030204" pitchFamily="18" charset="0"/>
+                        <a:ea typeface="Cambria Math" panose="02040503050406030204" pitchFamily="18" charset="0"/>
+                      </a:rPr>
+                      <m:t>−1+</m:t>
+                    </m:r>
+                    <m:r>
+                      <a:rPr lang="es-MX" sz="900" i="1">
+                        <a:solidFill>
+                          <a:schemeClr val="tx1"/>
+                        </a:solidFill>
+                        <a:latin typeface="Cambria Math" panose="02040503050406030204" pitchFamily="18" charset="0"/>
+                        <a:ea typeface="Cambria Math" panose="02040503050406030204" pitchFamily="18" charset="0"/>
+                      </a:rPr>
+                      <m:t>𝜃</m:t>
+                    </m:r>
+                    <m:r>
+                      <a:rPr lang="es-MX" sz="900" b="0" i="1" smtClean="0">
+                        <a:solidFill>
+                          <a:schemeClr val="tx1"/>
+                        </a:solidFill>
+                        <a:latin typeface="Cambria Math" panose="02040503050406030204" pitchFamily="18" charset="0"/>
+                        <a:ea typeface="Cambria Math" panose="02040503050406030204" pitchFamily="18" charset="0"/>
+                      </a:rPr>
+                      <m:t>2</m:t>
+                    </m:r>
+                    <m:r>
+                      <a:rPr lang="es-MX" sz="900" i="1">
+                        <a:solidFill>
+                          <a:schemeClr val="tx1"/>
+                        </a:solidFill>
+                        <a:latin typeface="Cambria Math" panose="02040503050406030204" pitchFamily="18" charset="0"/>
+                        <a:ea typeface="Cambria Math" panose="02040503050406030204" pitchFamily="18" charset="0"/>
+                      </a:rPr>
+                      <m:t>∗</m:t>
+                    </m:r>
+                    <m:r>
+                      <a:rPr lang="es-MX" sz="900" i="1">
+                        <a:solidFill>
+                          <a:schemeClr val="tx1"/>
+                        </a:solidFill>
+                        <a:latin typeface="Cambria Math" panose="02040503050406030204" pitchFamily="18" charset="0"/>
+                        <a:ea typeface="Cambria Math" panose="02040503050406030204" pitchFamily="18" charset="0"/>
+                      </a:rPr>
+                      <m:t>𝑋𝑡</m:t>
+                    </m:r>
+                    <m:r>
+                      <a:rPr lang="es-MX" sz="900" i="1">
+                        <a:solidFill>
+                          <a:schemeClr val="tx1"/>
+                        </a:solidFill>
+                        <a:latin typeface="Cambria Math" panose="02040503050406030204" pitchFamily="18" charset="0"/>
+                        <a:ea typeface="Cambria Math" panose="02040503050406030204" pitchFamily="18" charset="0"/>
+                      </a:rPr>
+                      <m:t>−2+</m:t>
+                    </m:r>
+                    <m:r>
+                      <a:rPr lang="es-MX" sz="900" i="1">
+                        <a:solidFill>
+                          <a:schemeClr val="tx1"/>
+                        </a:solidFill>
+                        <a:latin typeface="Cambria Math" panose="02040503050406030204" pitchFamily="18" charset="0"/>
+                        <a:ea typeface="Cambria Math" panose="02040503050406030204" pitchFamily="18" charset="0"/>
+                      </a:rPr>
+                      <m:t>𝜃</m:t>
+                    </m:r>
+                    <m:r>
+                      <a:rPr lang="es-MX" sz="900" i="1">
+                        <a:solidFill>
+                          <a:schemeClr val="tx1"/>
+                        </a:solidFill>
+                        <a:latin typeface="Cambria Math" panose="02040503050406030204" pitchFamily="18" charset="0"/>
+                        <a:ea typeface="Cambria Math" panose="02040503050406030204" pitchFamily="18" charset="0"/>
+                      </a:rPr>
+                      <m:t>2</m:t>
+                    </m:r>
+                    <m:r>
+                      <a:rPr lang="es-MX" sz="900" b="0" i="1" smtClean="0">
+                        <a:solidFill>
+                          <a:schemeClr val="tx1"/>
+                        </a:solidFill>
+                        <a:latin typeface="Cambria Math" panose="02040503050406030204" pitchFamily="18" charset="0"/>
+                        <a:ea typeface="Cambria Math" panose="02040503050406030204" pitchFamily="18" charset="0"/>
+                      </a:rPr>
+                      <m:t>𝜀</m:t>
+                    </m:r>
+                    <m:r>
+                      <a:rPr lang="es-MX" sz="900" b="0" i="1" smtClean="0">
+                        <a:solidFill>
+                          <a:schemeClr val="tx1"/>
+                        </a:solidFill>
+                        <a:latin typeface="Cambria Math" panose="02040503050406030204" pitchFamily="18" charset="0"/>
+                        <a:ea typeface="Cambria Math" panose="02040503050406030204" pitchFamily="18" charset="0"/>
+                      </a:rPr>
+                      <m:t>1∗ + </m:t>
+                    </m:r>
+                    <m:r>
+                      <a:rPr lang="es-MX" sz="900" b="0" i="1" smtClean="0">
+                        <a:solidFill>
+                          <a:schemeClr val="tx1"/>
+                        </a:solidFill>
+                        <a:latin typeface="Cambria Math" panose="02040503050406030204" pitchFamily="18" charset="0"/>
+                        <a:ea typeface="Cambria Math" panose="02040503050406030204" pitchFamily="18" charset="0"/>
+                      </a:rPr>
+                      <m:t>𝜀</m:t>
+                    </m:r>
+                    <m:r>
+                      <a:rPr lang="es-MX" sz="900" b="0" i="1" smtClean="0">
+                        <a:solidFill>
+                          <a:schemeClr val="tx1"/>
+                        </a:solidFill>
+                        <a:latin typeface="Cambria Math" panose="02040503050406030204" pitchFamily="18" charset="0"/>
+                        <a:ea typeface="Cambria Math" panose="02040503050406030204" pitchFamily="18" charset="0"/>
+                      </a:rPr>
+                      <m:t>𝑡</m:t>
+                    </m:r>
+                  </m:oMath>
+                </a14:m>
+                <a:endParaRPr lang="es-MX" sz="900" b="0" dirty="0">
+                  <a:solidFill>
+                    <a:schemeClr val="tx1"/>
+                  </a:solidFill>
+                  <a:latin typeface="+mn-lt"/>
+                  <a:ea typeface="Cambria Math" panose="02040503050406030204" pitchFamily="18" charset="0"/>
+                </a:endParaRPr>
+              </a:p>
+              <a:p>
+                <a:pPr lvl="0">
+                  <a:lnSpc>
+                    <a:spcPct val="95000"/>
+                  </a:lnSpc>
+                  <a:buClr>
+                    <a:schemeClr val="dk1"/>
+                  </a:buClr>
+                  <a:buSzPts val="1200"/>
+                </a:pPr>
+                <a:r>
+                  <a:rPr lang="es-MX" sz="900" dirty="0">
+                    <a:solidFill>
+                      <a:schemeClr val="tx1"/>
+                    </a:solidFill>
+                    <a:latin typeface="+mn-lt"/>
+                  </a:rPr>
+                  <a:t>Donde</a:t>
+                </a:r>
+              </a:p>
+              <a:p>
+                <a:pPr lvl="0">
+                  <a:lnSpc>
+                    <a:spcPct val="95000"/>
+                  </a:lnSpc>
+                  <a:buClr>
+                    <a:schemeClr val="dk1"/>
+                  </a:buClr>
+                  <a:buSzPts val="1200"/>
+                </a:pPr>
+                <a:r>
+                  <a:rPr lang="en-US" sz="900" dirty="0">
+                    <a:solidFill>
+                      <a:schemeClr val="dk1"/>
+                    </a:solidFill>
+                    <a:latin typeface="+mn-lt"/>
+                  </a:rPr>
+                  <a:t>y: Valor a </a:t>
+                </a:r>
+                <a:r>
+                  <a:rPr lang="en-US" sz="900" dirty="0" err="1">
+                    <a:solidFill>
+                      <a:schemeClr val="dk1"/>
+                    </a:solidFill>
+                    <a:latin typeface="+mn-lt"/>
+                  </a:rPr>
+                  <a:t>pronostica</a:t>
+                </a:r>
+                <a:r>
+                  <a:rPr lang="es-MX" sz="900" dirty="0">
+                    <a:solidFill>
+                      <a:schemeClr val="tx1"/>
+                    </a:solidFill>
+                    <a:latin typeface="+mn-lt"/>
+                  </a:rPr>
+                  <a:t>r</a:t>
+                </a:r>
+              </a:p>
+              <a:p>
+                <a:pPr lvl="0">
+                  <a:lnSpc>
+                    <a:spcPct val="95000"/>
+                  </a:lnSpc>
+                  <a:buClr>
+                    <a:schemeClr val="dk1"/>
+                  </a:buClr>
+                  <a:buSzPts val="1200"/>
+                </a:pPr>
+                <a:r>
+                  <a:rPr lang="en-US" sz="900" b="0" i="0" dirty="0">
+                    <a:solidFill>
+                      <a:schemeClr val="dk1"/>
+                    </a:solidFill>
+                    <a:latin typeface="+mn-lt"/>
+                    <a:ea typeface="Cambria Math" panose="02040503050406030204" pitchFamily="18" charset="0"/>
+                    <a:sym typeface="Arial"/>
+                  </a:rPr>
+                  <a:t>𝜃: </a:t>
+                </a:r>
+                <a:r>
+                  <a:rPr lang="en-US" sz="900" b="0" i="0" dirty="0" err="1">
+                    <a:solidFill>
+                      <a:schemeClr val="dk1"/>
+                    </a:solidFill>
+                    <a:latin typeface="+mn-lt"/>
+                    <a:ea typeface="Cambria Math" panose="02040503050406030204" pitchFamily="18" charset="0"/>
+                    <a:sym typeface="Arial"/>
+                  </a:rPr>
+                  <a:t>Parámetros</a:t>
+                </a:r>
+                <a:r>
+                  <a:rPr lang="en-US" sz="900" b="0" i="0" dirty="0">
+                    <a:solidFill>
+                      <a:schemeClr val="dk1"/>
+                    </a:solidFill>
+                    <a:latin typeface="+mn-lt"/>
+                    <a:ea typeface="Cambria Math" panose="02040503050406030204" pitchFamily="18" charset="0"/>
+                    <a:sym typeface="Arial"/>
+                  </a:rPr>
+                  <a:t> a </a:t>
+                </a:r>
+                <a:r>
+                  <a:rPr lang="en-US" sz="900" b="0" i="0" dirty="0" err="1">
+                    <a:solidFill>
+                      <a:schemeClr val="dk1"/>
+                    </a:solidFill>
+                    <a:latin typeface="+mn-lt"/>
+                    <a:ea typeface="Cambria Math" panose="02040503050406030204" pitchFamily="18" charset="0"/>
+                    <a:sym typeface="Arial"/>
+                  </a:rPr>
+                  <a:t>ajustar</a:t>
+                </a:r>
+                <a:r>
+                  <a:rPr lang="en-US" sz="900" b="0" i="0" dirty="0">
+                    <a:solidFill>
+                      <a:schemeClr val="dk1"/>
+                    </a:solidFill>
+                    <a:latin typeface="+mn-lt"/>
+                    <a:ea typeface="Cambria Math" panose="02040503050406030204" pitchFamily="18" charset="0"/>
+                    <a:sym typeface="Arial"/>
+                  </a:rPr>
+                  <a:t> para </a:t>
+                </a:r>
+                <a:r>
+                  <a:rPr lang="en-US" sz="900" b="0" i="0" dirty="0" err="1">
+                    <a:solidFill>
+                      <a:schemeClr val="dk1"/>
+                    </a:solidFill>
+                    <a:latin typeface="+mn-lt"/>
+                    <a:ea typeface="Cambria Math" panose="02040503050406030204" pitchFamily="18" charset="0"/>
+                    <a:sym typeface="Arial"/>
+                  </a:rPr>
+                  <a:t>cada</a:t>
+                </a:r>
+                <a:r>
+                  <a:rPr lang="en-US" sz="900" b="0" i="0" dirty="0">
+                    <a:solidFill>
+                      <a:schemeClr val="dk1"/>
+                    </a:solidFill>
+                    <a:latin typeface="+mn-lt"/>
+                    <a:ea typeface="Cambria Math" panose="02040503050406030204" pitchFamily="18" charset="0"/>
+                    <a:sym typeface="Arial"/>
+                  </a:rPr>
+                  <a:t> </a:t>
+                </a:r>
+                <a:r>
+                  <a:rPr lang="en-US" sz="900" b="0" i="0" dirty="0" err="1">
+                    <a:solidFill>
+                      <a:schemeClr val="dk1"/>
+                    </a:solidFill>
+                    <a:latin typeface="+mn-lt"/>
+                    <a:ea typeface="Cambria Math" panose="02040503050406030204" pitchFamily="18" charset="0"/>
+                    <a:sym typeface="Arial"/>
+                  </a:rPr>
+                  <a:t>caso</a:t>
+                </a:r>
+                <a:r>
+                  <a:rPr lang="en-US" sz="900" b="0" i="0" dirty="0">
+                    <a:solidFill>
+                      <a:schemeClr val="dk1"/>
+                    </a:solidFill>
+                    <a:latin typeface="+mn-lt"/>
+                    <a:ea typeface="Cambria Math" panose="02040503050406030204" pitchFamily="18" charset="0"/>
+                    <a:sym typeface="Arial"/>
+                  </a:rPr>
+                  <a:t> </a:t>
+                </a:r>
+              </a:p>
+              <a:p>
+                <a:pPr lvl="0">
+                  <a:lnSpc>
+                    <a:spcPct val="95000"/>
+                  </a:lnSpc>
+                  <a:buClr>
+                    <a:schemeClr val="dk1"/>
+                  </a:buClr>
+                  <a:buSzPts val="1200"/>
+                </a:pPr>
+                <a:r>
+                  <a:rPr lang="en-US" sz="900" b="0" i="0" dirty="0" err="1">
+                    <a:solidFill>
+                      <a:schemeClr val="dk1"/>
+                    </a:solidFill>
+                    <a:latin typeface="+mn-lt"/>
+                    <a:ea typeface="Cambria Math" panose="02040503050406030204" pitchFamily="18" charset="0"/>
+                    <a:sym typeface="Arial"/>
+                  </a:rPr>
+                  <a:t>Xt</a:t>
+                </a:r>
+                <a:r>
+                  <a:rPr lang="en-US" sz="900" b="0" i="0" dirty="0">
+                    <a:solidFill>
+                      <a:schemeClr val="dk1"/>
+                    </a:solidFill>
+                    <a:latin typeface="+mn-lt"/>
+                    <a:ea typeface="Cambria Math" panose="02040503050406030204" pitchFamily="18" charset="0"/>
+                    <a:sym typeface="Arial"/>
+                  </a:rPr>
+                  <a:t>-s: </a:t>
+                </a:r>
+                <a:r>
+                  <a:rPr lang="en-US" sz="900" b="0" i="0" dirty="0" err="1">
+                    <a:solidFill>
+                      <a:schemeClr val="dk1"/>
+                    </a:solidFill>
+                    <a:latin typeface="+mn-lt"/>
+                    <a:ea typeface="Cambria Math" panose="02040503050406030204" pitchFamily="18" charset="0"/>
+                    <a:sym typeface="Arial"/>
+                  </a:rPr>
+                  <a:t>Valores</a:t>
+                </a:r>
+                <a:r>
+                  <a:rPr lang="en-US" sz="900" b="0" i="0" dirty="0">
+                    <a:solidFill>
+                      <a:schemeClr val="dk1"/>
+                    </a:solidFill>
+                    <a:latin typeface="+mn-lt"/>
+                    <a:ea typeface="Cambria Math" panose="02040503050406030204" pitchFamily="18" charset="0"/>
+                    <a:sym typeface="Arial"/>
+                  </a:rPr>
+                  <a:t> de la variable y a t-s </a:t>
+                </a:r>
+              </a:p>
+              <a:p>
+                <a:pPr lvl="0">
+                  <a:lnSpc>
+                    <a:spcPct val="95000"/>
+                  </a:lnSpc>
+                  <a:buClr>
+                    <a:schemeClr val="dk1"/>
+                  </a:buClr>
+                  <a:buSzPts val="1200"/>
+                </a:pPr>
+                <a14:m>
+                  <m:oMathPara xmlns:m="http://schemas.openxmlformats.org/officeDocument/2006/math">
+                    <m:oMathParaPr>
+                      <m:jc m:val="left"/>
+                    </m:oMathParaPr>
+                    <m:oMath xmlns:m="http://schemas.openxmlformats.org/officeDocument/2006/math">
+                      <m:r>
+                        <a:rPr lang="es-MX" sz="900" b="0" i="1" smtClean="0">
+                          <a:solidFill>
+                            <a:schemeClr val="tx1"/>
+                          </a:solidFill>
+                          <a:latin typeface="+mn-lt"/>
+                          <a:ea typeface="Cambria Math" panose="02040503050406030204" pitchFamily="18" charset="0"/>
+                        </a:rPr>
+                        <m:t>𝜀</m:t>
+                      </m:r>
+                      <m:r>
+                        <a:rPr lang="es-MX" sz="900" b="0" i="1" smtClean="0">
+                          <a:solidFill>
+                            <a:schemeClr val="tx1"/>
+                          </a:solidFill>
+                          <a:latin typeface="+mn-lt"/>
+                          <a:ea typeface="Cambria Math" panose="02040503050406030204" pitchFamily="18" charset="0"/>
+                        </a:rPr>
+                        <m:t>𝑡</m:t>
+                      </m:r>
+                      <m:r>
+                        <a:rPr lang="es-MX" sz="900" b="0" i="1" smtClean="0">
+                          <a:solidFill>
+                            <a:schemeClr val="tx1"/>
+                          </a:solidFill>
+                          <a:latin typeface="+mn-lt"/>
+                          <a:ea typeface="Cambria Math" panose="02040503050406030204" pitchFamily="18" charset="0"/>
+                        </a:rPr>
+                        <m:t>−</m:t>
+                      </m:r>
+                      <m:r>
+                        <a:rPr lang="es-MX" sz="900" b="0" i="1" smtClean="0">
+                          <a:solidFill>
+                            <a:schemeClr val="tx1"/>
+                          </a:solidFill>
+                          <a:latin typeface="+mn-lt"/>
+                          <a:ea typeface="Cambria Math" panose="02040503050406030204" pitchFamily="18" charset="0"/>
+                        </a:rPr>
+                        <m:t>𝑠</m:t>
+                      </m:r>
+                      <m:r>
+                        <a:rPr lang="es-MX" sz="900" b="0" i="1" smtClean="0">
+                          <a:solidFill>
+                            <a:schemeClr val="tx1"/>
+                          </a:solidFill>
+                          <a:latin typeface="+mn-lt"/>
+                          <a:ea typeface="Cambria Math" panose="02040503050406030204" pitchFamily="18" charset="0"/>
+                        </a:rPr>
+                        <m:t>:</m:t>
+                      </m:r>
+                      <m:r>
+                        <m:rPr>
+                          <m:nor/>
+                        </m:rPr>
+                        <a:rPr lang="es-MX" sz="900" b="0" i="0" smtClean="0">
+                          <a:solidFill>
+                            <a:schemeClr val="tx1"/>
+                          </a:solidFill>
+                          <a:latin typeface="+mn-lt"/>
+                          <a:ea typeface="Cambria Math" panose="02040503050406030204" pitchFamily="18" charset="0"/>
+                        </a:rPr>
+                        <m:t> </m:t>
+                      </m:r>
+                      <m:r>
+                        <m:rPr>
+                          <m:nor/>
+                        </m:rPr>
+                        <a:rPr lang="es-MX" sz="900" b="0" i="0" dirty="0" smtClean="0">
+                          <a:solidFill>
+                            <a:schemeClr val="dk1"/>
+                          </a:solidFill>
+                          <a:latin typeface="+mn-lt"/>
+                          <a:ea typeface="Cambria Math" panose="02040503050406030204" pitchFamily="18" charset="0"/>
+                        </a:rPr>
+                        <m:t>Errores</m:t>
+                      </m:r>
+                      <m:r>
+                        <m:rPr>
+                          <m:nor/>
+                        </m:rPr>
+                        <a:rPr lang="es-MX" sz="900" b="0" i="0" dirty="0" smtClean="0">
+                          <a:solidFill>
+                            <a:schemeClr val="dk1"/>
+                          </a:solidFill>
+                          <a:latin typeface="+mn-lt"/>
+                          <a:ea typeface="Cambria Math" panose="02040503050406030204" pitchFamily="18" charset="0"/>
+                        </a:rPr>
+                        <m:t> </m:t>
+                      </m:r>
+                      <m:r>
+                        <m:rPr>
+                          <m:nor/>
+                        </m:rPr>
+                        <a:rPr lang="es-MX" sz="900" b="0" i="0" dirty="0" smtClean="0">
+                          <a:solidFill>
+                            <a:schemeClr val="dk1"/>
+                          </a:solidFill>
+                          <a:latin typeface="+mn-lt"/>
+                          <a:ea typeface="Cambria Math" panose="02040503050406030204" pitchFamily="18" charset="0"/>
+                        </a:rPr>
+                        <m:t>de</m:t>
+                      </m:r>
+                      <m:r>
+                        <m:rPr>
+                          <m:nor/>
+                        </m:rPr>
+                        <a:rPr lang="es-MX" sz="900" b="0" i="0" dirty="0" smtClean="0">
+                          <a:solidFill>
+                            <a:schemeClr val="dk1"/>
+                          </a:solidFill>
+                          <a:latin typeface="+mn-lt"/>
+                          <a:ea typeface="Cambria Math" panose="02040503050406030204" pitchFamily="18" charset="0"/>
+                        </a:rPr>
+                        <m:t> </m:t>
+                      </m:r>
+                      <m:r>
+                        <m:rPr>
+                          <m:nor/>
+                        </m:rPr>
+                        <a:rPr lang="es-MX" sz="900" b="0" i="0" dirty="0" smtClean="0">
+                          <a:solidFill>
+                            <a:schemeClr val="dk1"/>
+                          </a:solidFill>
+                          <a:latin typeface="+mn-lt"/>
+                          <a:ea typeface="Cambria Math" panose="02040503050406030204" pitchFamily="18" charset="0"/>
+                        </a:rPr>
+                        <m:t>la</m:t>
+                      </m:r>
+                      <m:r>
+                        <m:rPr>
+                          <m:nor/>
+                        </m:rPr>
+                        <a:rPr lang="es-MX" sz="900" b="0" i="0" dirty="0" smtClean="0">
+                          <a:solidFill>
+                            <a:schemeClr val="dk1"/>
+                          </a:solidFill>
+                          <a:latin typeface="+mn-lt"/>
+                          <a:ea typeface="Cambria Math" panose="02040503050406030204" pitchFamily="18" charset="0"/>
+                        </a:rPr>
+                        <m:t> </m:t>
+                      </m:r>
+                      <m:r>
+                        <m:rPr>
+                          <m:nor/>
+                        </m:rPr>
+                        <a:rPr lang="es-MX" sz="900" b="0" i="0" dirty="0" smtClean="0">
+                          <a:solidFill>
+                            <a:schemeClr val="dk1"/>
+                          </a:solidFill>
+                          <a:latin typeface="+mn-lt"/>
+                          <a:ea typeface="Cambria Math" panose="02040503050406030204" pitchFamily="18" charset="0"/>
+                        </a:rPr>
+                        <m:t>variable</m:t>
+                      </m:r>
+                      <m:r>
+                        <m:rPr>
+                          <m:nor/>
+                        </m:rPr>
+                        <a:rPr lang="es-MX" sz="900" b="0" i="0" dirty="0" smtClean="0">
+                          <a:solidFill>
+                            <a:schemeClr val="dk1"/>
+                          </a:solidFill>
+                          <a:latin typeface="+mn-lt"/>
+                          <a:ea typeface="Cambria Math" panose="02040503050406030204" pitchFamily="18" charset="0"/>
+                        </a:rPr>
+                        <m:t> </m:t>
+                      </m:r>
+                      <m:r>
+                        <m:rPr>
+                          <m:nor/>
+                        </m:rPr>
+                        <a:rPr lang="es-MX" sz="900" b="0" i="0" dirty="0" smtClean="0">
+                          <a:solidFill>
+                            <a:schemeClr val="dk1"/>
+                          </a:solidFill>
+                          <a:latin typeface="+mn-lt"/>
+                          <a:ea typeface="Cambria Math" panose="02040503050406030204" pitchFamily="18" charset="0"/>
+                        </a:rPr>
+                        <m:t>y</m:t>
+                      </m:r>
+                      <m:r>
+                        <m:rPr>
+                          <m:nor/>
+                        </m:rPr>
+                        <a:rPr lang="es-MX" sz="900" b="0" i="0" dirty="0" smtClean="0">
+                          <a:solidFill>
+                            <a:schemeClr val="dk1"/>
+                          </a:solidFill>
+                          <a:latin typeface="+mn-lt"/>
+                          <a:ea typeface="Cambria Math" panose="02040503050406030204" pitchFamily="18" charset="0"/>
+                        </a:rPr>
+                        <m:t> </m:t>
+                      </m:r>
+                      <m:r>
+                        <m:rPr>
+                          <m:nor/>
+                        </m:rPr>
+                        <a:rPr lang="es-MX" sz="900" b="0" i="0" dirty="0" smtClean="0">
+                          <a:solidFill>
+                            <a:schemeClr val="dk1"/>
+                          </a:solidFill>
+                          <a:latin typeface="+mn-lt"/>
+                          <a:ea typeface="Cambria Math" panose="02040503050406030204" pitchFamily="18" charset="0"/>
+                        </a:rPr>
+                        <m:t>a</m:t>
+                      </m:r>
+                      <m:r>
+                        <m:rPr>
+                          <m:nor/>
+                        </m:rPr>
+                        <a:rPr lang="es-MX" sz="900" b="0" i="0" dirty="0" smtClean="0">
+                          <a:solidFill>
+                            <a:schemeClr val="dk1"/>
+                          </a:solidFill>
+                          <a:latin typeface="+mn-lt"/>
+                          <a:ea typeface="Cambria Math" panose="02040503050406030204" pitchFamily="18" charset="0"/>
+                        </a:rPr>
+                        <m:t> </m:t>
+                      </m:r>
+                      <m:r>
+                        <m:rPr>
+                          <m:nor/>
+                        </m:rPr>
+                        <a:rPr lang="es-MX" sz="900" b="0" i="0" dirty="0" smtClean="0">
+                          <a:solidFill>
+                            <a:schemeClr val="dk1"/>
+                          </a:solidFill>
+                          <a:latin typeface="+mn-lt"/>
+                          <a:ea typeface="Cambria Math" panose="02040503050406030204" pitchFamily="18" charset="0"/>
+                        </a:rPr>
+                        <m:t>t</m:t>
+                      </m:r>
+                      <m:r>
+                        <m:rPr>
+                          <m:nor/>
+                        </m:rPr>
+                        <a:rPr lang="es-MX" sz="900" b="0" i="0" dirty="0" smtClean="0">
+                          <a:solidFill>
+                            <a:schemeClr val="dk1"/>
+                          </a:solidFill>
+                          <a:latin typeface="+mn-lt"/>
+                          <a:ea typeface="Cambria Math" panose="02040503050406030204" pitchFamily="18" charset="0"/>
+                        </a:rPr>
+                        <m:t>−</m:t>
+                      </m:r>
+                      <m:r>
+                        <m:rPr>
+                          <m:nor/>
+                        </m:rPr>
+                        <a:rPr lang="es-MX" sz="900" b="0" i="0" dirty="0" smtClean="0">
+                          <a:solidFill>
+                            <a:schemeClr val="dk1"/>
+                          </a:solidFill>
+                          <a:latin typeface="+mn-lt"/>
+                          <a:ea typeface="Cambria Math" panose="02040503050406030204" pitchFamily="18" charset="0"/>
+                        </a:rPr>
+                        <m:t>s</m:t>
+                      </m:r>
+                    </m:oMath>
+                  </m:oMathPara>
+                </a14:m>
+                <a:endParaRPr lang="en-US" sz="900" b="0" i="0" dirty="0">
+                  <a:solidFill>
+                    <a:schemeClr val="dk1"/>
+                  </a:solidFill>
+                  <a:latin typeface="+mn-lt"/>
+                  <a:ea typeface="Cambria Math" panose="02040503050406030204" pitchFamily="18" charset="0"/>
+                  <a:sym typeface="Arial"/>
+                </a:endParaRPr>
+              </a:p>
+              <a:p>
+                <a:pPr lvl="0">
+                  <a:lnSpc>
+                    <a:spcPct val="95000"/>
+                  </a:lnSpc>
+                  <a:buClr>
+                    <a:schemeClr val="dk1"/>
+                  </a:buClr>
+                  <a:buSzPts val="1200"/>
+                </a:pPr>
+                <a:r>
+                  <a:rPr lang="en-US" sz="900" dirty="0">
+                    <a:solidFill>
+                      <a:schemeClr val="dk1"/>
+                    </a:solidFill>
+                    <a:latin typeface="+mn-lt"/>
+                    <a:ea typeface="Cambria Math" panose="02040503050406030204" pitchFamily="18" charset="0"/>
+                  </a:rPr>
+                  <a:t>s: </a:t>
+                </a:r>
+                <a:r>
+                  <a:rPr lang="en-US" sz="900" dirty="0" err="1">
+                    <a:solidFill>
+                      <a:schemeClr val="dk1"/>
+                    </a:solidFill>
+                    <a:latin typeface="+mn-lt"/>
+                    <a:ea typeface="Cambria Math" panose="02040503050406030204" pitchFamily="18" charset="0"/>
+                  </a:rPr>
+                  <a:t>Rezago</a:t>
+                </a:r>
+                <a:r>
+                  <a:rPr lang="en-US" sz="900" dirty="0">
+                    <a:solidFill>
+                      <a:schemeClr val="dk1"/>
+                    </a:solidFill>
+                    <a:latin typeface="+mn-lt"/>
+                    <a:ea typeface="Cambria Math" panose="02040503050406030204" pitchFamily="18" charset="0"/>
+                  </a:rPr>
+                  <a:t> </a:t>
+                </a:r>
+                <a:r>
+                  <a:rPr lang="en-US" sz="900" dirty="0" err="1">
+                    <a:solidFill>
+                      <a:schemeClr val="dk1"/>
+                    </a:solidFill>
+                    <a:latin typeface="+mn-lt"/>
+                    <a:ea typeface="Cambria Math" panose="02040503050406030204" pitchFamily="18" charset="0"/>
+                  </a:rPr>
+                  <a:t>en</a:t>
+                </a:r>
+                <a:r>
+                  <a:rPr lang="en-US" sz="900" dirty="0">
+                    <a:solidFill>
+                      <a:schemeClr val="dk1"/>
+                    </a:solidFill>
+                    <a:latin typeface="+mn-lt"/>
+                    <a:ea typeface="Cambria Math" panose="02040503050406030204" pitchFamily="18" charset="0"/>
+                  </a:rPr>
+                  <a:t> </a:t>
+                </a:r>
+                <a:r>
+                  <a:rPr lang="en-US" sz="900" dirty="0" err="1">
+                    <a:solidFill>
+                      <a:schemeClr val="dk1"/>
+                    </a:solidFill>
+                    <a:latin typeface="+mn-lt"/>
+                    <a:ea typeface="Cambria Math" panose="02040503050406030204" pitchFamily="18" charset="0"/>
+                  </a:rPr>
+                  <a:t>el</a:t>
+                </a:r>
+                <a:r>
+                  <a:rPr lang="en-US" sz="900" dirty="0">
+                    <a:solidFill>
+                      <a:schemeClr val="dk1"/>
+                    </a:solidFill>
+                    <a:latin typeface="+mn-lt"/>
+                    <a:ea typeface="Cambria Math" panose="02040503050406030204" pitchFamily="18" charset="0"/>
+                  </a:rPr>
+                  <a:t> </a:t>
+                </a:r>
+                <a:r>
+                  <a:rPr lang="en-US" sz="900" dirty="0" err="1">
+                    <a:solidFill>
+                      <a:schemeClr val="dk1"/>
+                    </a:solidFill>
+                    <a:latin typeface="+mn-lt"/>
+                    <a:ea typeface="Cambria Math" panose="02040503050406030204" pitchFamily="18" charset="0"/>
+                  </a:rPr>
+                  <a:t>tiempo</a:t>
+                </a:r>
+                <a:r>
+                  <a:rPr lang="en-US" sz="900" dirty="0">
+                    <a:solidFill>
+                      <a:schemeClr val="dk1"/>
+                    </a:solidFill>
+                    <a:latin typeface="+mn-lt"/>
+                    <a:ea typeface="Cambria Math" panose="02040503050406030204" pitchFamily="18" charset="0"/>
+                  </a:rPr>
+                  <a:t> s={1,2,3..k}</a:t>
+                </a:r>
+                <a:endParaRPr lang="en-US" sz="900" b="0" i="0" dirty="0">
+                  <a:solidFill>
+                    <a:schemeClr val="dk1"/>
+                  </a:solidFill>
+                  <a:latin typeface="+mn-lt"/>
+                  <a:ea typeface="Cambria Math" panose="02040503050406030204" pitchFamily="18" charset="0"/>
+                  <a:sym typeface="Arial"/>
+                </a:endParaRPr>
+              </a:p>
+              <a:p>
+                <a:pPr lvl="0">
+                  <a:lnSpc>
+                    <a:spcPct val="95000"/>
+                  </a:lnSpc>
+                  <a:buClr>
+                    <a:schemeClr val="dk1"/>
+                  </a:buClr>
+                  <a:buSzPts val="1200"/>
+                </a:pPr>
+                <a:endParaRPr lang="es-MX" sz="1100" dirty="0">
+                  <a:solidFill>
+                    <a:schemeClr val="tx1"/>
+                  </a:solidFill>
+                  <a:latin typeface="+mn-lt"/>
+                </a:endParaRPr>
+              </a:p>
+            </p:txBody>
+          </p:sp>
+        </mc:Choice>
+        <mc:Fallback>
+          <p:sp>
+            <p:nvSpPr>
+              <p:cNvPr id="33" name="Google Shape;89;p1">
+                <a:extLst>
+                  <a:ext uri="{FF2B5EF4-FFF2-40B4-BE49-F238E27FC236}">
+                    <a16:creationId xmlns:a16="http://schemas.microsoft.com/office/drawing/2014/main" id="{F02E3659-BF49-3676-90D6-AF59E5FC1E8A}"/>
+                  </a:ext>
+                </a:extLst>
+              </p:cNvPr>
+              <p:cNvSpPr txBox="1">
+                <a:spLocks noRot="1" noChangeAspect="1" noMove="1" noResize="1" noEditPoints="1" noAdjustHandles="1" noChangeArrowheads="1" noChangeShapeType="1" noTextEdit="1"/>
+              </p:cNvSpPr>
+              <p:nvPr/>
+            </p:nvSpPr>
+            <p:spPr>
+              <a:xfrm>
+                <a:off x="3120493" y="6288295"/>
+                <a:ext cx="4567044" cy="1134544"/>
+              </a:xfrm>
+              <a:prstGeom prst="rect">
+                <a:avLst/>
+              </a:prstGeom>
+              <a:blipFill>
+                <a:blip r:embed="rId11"/>
+                <a:stretch>
+                  <a:fillRect l="-534" t="-2151"/>
+                </a:stretch>
+              </a:blipFill>
+              <a:ln>
+                <a:noFill/>
+              </a:ln>
+            </p:spPr>
+            <p:txBody>
+              <a:bodyPr/>
+              <a:lstStyle/>
+              <a:p>
+                <a:r>
+                  <a:rPr lang="es-MX">
+                    <a:noFill/>
+                  </a:rPr>
+                  <a:t> </a:t>
+                </a:r>
+              </a:p>
+            </p:txBody>
+          </p:sp>
+        </mc:Fallback>
+      </mc:AlternateContent>
+      <p:sp>
+        <p:nvSpPr>
+          <p:cNvPr id="34" name="TextBox 33">
+            <a:extLst>
+              <a:ext uri="{FF2B5EF4-FFF2-40B4-BE49-F238E27FC236}">
+                <a16:creationId xmlns:a16="http://schemas.microsoft.com/office/drawing/2014/main" id="{88BEBDC0-10FA-C061-4846-E17491169B1D}"/>
+              </a:ext>
+            </a:extLst>
+          </p:cNvPr>
+          <p:cNvSpPr txBox="1"/>
+          <p:nvPr/>
+        </p:nvSpPr>
+        <p:spPr>
+          <a:xfrm>
+            <a:off x="990052" y="4747305"/>
+            <a:ext cx="4886960" cy="940257"/>
+          </a:xfrm>
+          <a:prstGeom prst="rect">
+            <a:avLst/>
+          </a:prstGeom>
+          <a:noFill/>
+        </p:spPr>
+        <p:txBody>
+          <a:bodyPr wrap="square">
+            <a:spAutoFit/>
+          </a:bodyPr>
+          <a:lstStyle/>
+          <a:p>
+            <a:pPr lvl="0" algn="ctr">
+              <a:lnSpc>
+                <a:spcPct val="95000"/>
+              </a:lnSpc>
+              <a:buClr>
+                <a:schemeClr val="dk1"/>
+              </a:buClr>
+              <a:buSzPts val="1200"/>
+            </a:pPr>
+            <a:r>
+              <a:rPr lang="es-MX" sz="1000" dirty="0">
+                <a:solidFill>
+                  <a:schemeClr val="tx1"/>
+                </a:solidFill>
+                <a:latin typeface="+mn-lt"/>
+              </a:rPr>
+              <a:t>g(E[Y ]) = β0 + β1X1 + . . . + β</a:t>
+            </a:r>
+            <a:r>
+              <a:rPr lang="es-MX" sz="1000" dirty="0" err="1">
+                <a:solidFill>
+                  <a:schemeClr val="tx1"/>
+                </a:solidFill>
+                <a:latin typeface="+mn-lt"/>
+              </a:rPr>
+              <a:t>kXk</a:t>
+            </a:r>
+            <a:endParaRPr lang="es-MX" sz="1000" dirty="0">
+              <a:solidFill>
+                <a:schemeClr val="tx1"/>
+              </a:solidFill>
+              <a:latin typeface="+mn-lt"/>
+              <a:sym typeface="Encode Sans Thin"/>
+            </a:endParaRPr>
+          </a:p>
+          <a:p>
+            <a:pPr lvl="0">
+              <a:lnSpc>
+                <a:spcPct val="95000"/>
+              </a:lnSpc>
+              <a:buClr>
+                <a:schemeClr val="dk1"/>
+              </a:buClr>
+              <a:buSzPts val="1200"/>
+            </a:pPr>
+            <a:r>
+              <a:rPr lang="es-MX" sz="1000" dirty="0">
+                <a:solidFill>
+                  <a:schemeClr val="tx1"/>
+                </a:solidFill>
+                <a:latin typeface="+mn-lt"/>
+              </a:rPr>
+              <a:t>Y que tiene tres principales componentes: </a:t>
+            </a:r>
+          </a:p>
+          <a:p>
+            <a:pPr lvl="0">
+              <a:lnSpc>
+                <a:spcPct val="95000"/>
+              </a:lnSpc>
+              <a:buClr>
+                <a:schemeClr val="dk1"/>
+              </a:buClr>
+              <a:buSzPts val="1200"/>
+            </a:pPr>
+            <a:r>
+              <a:rPr lang="es-MX" sz="900" dirty="0">
+                <a:solidFill>
+                  <a:schemeClr val="dk1"/>
+                </a:solidFill>
+                <a:latin typeface="+mn-lt"/>
+              </a:rPr>
+              <a:t>y: </a:t>
+            </a:r>
+            <a:r>
+              <a:rPr lang="es-MX" sz="1000" dirty="0">
+                <a:solidFill>
+                  <a:schemeClr val="tx1"/>
+                </a:solidFill>
+                <a:latin typeface="+mn-lt"/>
+              </a:rPr>
+              <a:t>Componente aleatorio: La variable respuesta y, que pertenece a la familia exponencial </a:t>
+            </a:r>
+          </a:p>
+          <a:p>
+            <a:pPr lvl="0">
+              <a:lnSpc>
+                <a:spcPct val="95000"/>
+              </a:lnSpc>
+              <a:buClr>
+                <a:schemeClr val="dk1"/>
+              </a:buClr>
+              <a:buSzPts val="1200"/>
+            </a:pPr>
+            <a:r>
+              <a:rPr lang="es-MX" sz="900" b="0" i="0" dirty="0">
+                <a:solidFill>
+                  <a:schemeClr val="dk1"/>
+                </a:solidFill>
+                <a:latin typeface="+mn-lt"/>
+                <a:ea typeface="Cambria Math" panose="02040503050406030204" pitchFamily="18" charset="0"/>
+                <a:sym typeface="Arial"/>
+              </a:rPr>
+              <a:t>Xi: </a:t>
+            </a:r>
+            <a:r>
+              <a:rPr lang="es-MX" sz="900" dirty="0">
+                <a:solidFill>
+                  <a:schemeClr val="dk1"/>
+                </a:solidFill>
+                <a:latin typeface="+mn-lt"/>
+                <a:ea typeface="Cambria Math" panose="02040503050406030204" pitchFamily="18" charset="0"/>
+              </a:rPr>
+              <a:t>Componente sistemático: Las variables predictoras Xi i = 1 . . . k</a:t>
+            </a:r>
+          </a:p>
+          <a:p>
+            <a:pPr lvl="0">
+              <a:lnSpc>
+                <a:spcPct val="95000"/>
+              </a:lnSpc>
+              <a:buClr>
+                <a:schemeClr val="dk1"/>
+              </a:buClr>
+              <a:buSzPts val="1200"/>
+            </a:pPr>
+            <a:r>
+              <a:rPr lang="es-MX" sz="900" dirty="0">
+                <a:solidFill>
+                  <a:schemeClr val="dk1"/>
+                </a:solidFill>
+                <a:latin typeface="+mn-lt"/>
+                <a:ea typeface="Cambria Math" panose="02040503050406030204" pitchFamily="18" charset="0"/>
+              </a:rPr>
+              <a:t>Función Link: La función que relaciona la media, E[Y ], con las variables predictoras X</a:t>
+            </a:r>
+          </a:p>
+        </p:txBody>
+      </p:sp>
       <p:graphicFrame>
         <p:nvGraphicFramePr>
-          <p:cNvPr id="26" name="Tabela 25">
+          <p:cNvPr id="35" name="Tabela 25">
             <a:extLst>
               <a:ext uri="{FF2B5EF4-FFF2-40B4-BE49-F238E27FC236}">
-                <a16:creationId xmlns:a16="http://schemas.microsoft.com/office/drawing/2014/main" id="{79D1F590-B4A2-3A6D-9C54-00D31BD11644}"/>
+                <a16:creationId xmlns:a16="http://schemas.microsoft.com/office/drawing/2014/main" id="{DCF467F2-2866-EB6C-E2D1-857FCBA81D26}"/>
               </a:ext>
             </a:extLst>
           </p:cNvPr>
@@ -20991,14 +20943,14 @@
           <p:nvPr>
             <p:extLst>
               <p:ext uri="{D42A27DB-BD31-4B8C-83A1-F6EECF244321}">
-                <p14:modId xmlns:p14="http://schemas.microsoft.com/office/powerpoint/2010/main" val="2628723008"/>
+                <p14:modId xmlns:p14="http://schemas.microsoft.com/office/powerpoint/2010/main" val="662960199"/>
               </p:ext>
             </p:extLst>
           </p:nvPr>
         </p:nvGraphicFramePr>
         <p:xfrm>
-          <a:off x="5498409" y="5063827"/>
-          <a:ext cx="3306273" cy="853440"/>
+          <a:off x="5560519" y="4790713"/>
+          <a:ext cx="3793646" cy="853440"/>
         </p:xfrm>
         <a:graphic>
           <a:graphicData uri="http://schemas.openxmlformats.org/drawingml/2006/table">
@@ -21007,14 +20959,14 @@
                 <a:tableStyleId>{2D5ABB26-0587-4C30-8999-92F81FD0307C}</a:tableStyleId>
               </a:tblPr>
               <a:tblGrid>
-                <a:gridCol w="1595914">
+                <a:gridCol w="1698801">
                   <a:extLst>
                     <a:ext uri="{9D8B030D-6E8A-4147-A177-3AD203B41FA5}">
                       <a16:colId xmlns:a16="http://schemas.microsoft.com/office/drawing/2014/main" val="156563870"/>
                     </a:ext>
                   </a:extLst>
                 </a:gridCol>
-                <a:gridCol w="1710359">
+                <a:gridCol w="2094845">
                   <a:extLst>
                     <a:ext uri="{9D8B030D-6E8A-4147-A177-3AD203B41FA5}">
                       <a16:colId xmlns:a16="http://schemas.microsoft.com/office/drawing/2014/main" val="785389531"/>
@@ -21039,44 +20991,7 @@
                       </a:endParaRPr>
                     </a:p>
                   </a:txBody>
-                  <a:tcPr anchor="ctr">
-                    <a:lnL w="6350" cap="flat" cmpd="sng" algn="ctr">
-                      <a:solidFill>
-                        <a:schemeClr val="tx1"/>
-                      </a:solidFill>
-                      <a:prstDash val="solid"/>
-                      <a:round/>
-                      <a:headEnd type="none" w="med" len="med"/>
-                      <a:tailEnd type="none" w="med" len="med"/>
-                    </a:lnL>
-                    <a:lnR w="6350" cap="flat" cmpd="sng" algn="ctr">
-                      <a:solidFill>
-                        <a:schemeClr val="tx1"/>
-                      </a:solidFill>
-                      <a:prstDash val="solid"/>
-                      <a:round/>
-                      <a:headEnd type="none" w="med" len="med"/>
-                      <a:tailEnd type="none" w="med" len="med"/>
-                    </a:lnR>
-                    <a:lnT w="6350" cap="flat" cmpd="sng" algn="ctr">
-                      <a:solidFill>
-                        <a:schemeClr val="tx1"/>
-                      </a:solidFill>
-                      <a:prstDash val="solid"/>
-                      <a:round/>
-                      <a:headEnd type="none" w="med" len="med"/>
-                      <a:tailEnd type="none" w="med" len="med"/>
-                    </a:lnT>
-                    <a:lnB w="6350" cap="flat" cmpd="sng" algn="ctr">
-                      <a:solidFill>
-                        <a:schemeClr val="tx1"/>
-                      </a:solidFill>
-                      <a:prstDash val="solid"/>
-                      <a:round/>
-                      <a:headEnd type="none" w="med" len="med"/>
-                      <a:tailEnd type="none" w="med" len="med"/>
-                    </a:lnB>
-                  </a:tcPr>
+                  <a:tcPr anchor="ctr"/>
                 </a:tc>
                 <a:tc>
                   <a:txBody>
@@ -21094,44 +21009,7 @@
                       </a:endParaRPr>
                     </a:p>
                   </a:txBody>
-                  <a:tcPr anchor="ctr">
-                    <a:lnL w="6350" cap="flat" cmpd="sng" algn="ctr">
-                      <a:solidFill>
-                        <a:schemeClr val="tx1"/>
-                      </a:solidFill>
-                      <a:prstDash val="solid"/>
-                      <a:round/>
-                      <a:headEnd type="none" w="med" len="med"/>
-                      <a:tailEnd type="none" w="med" len="med"/>
-                    </a:lnL>
-                    <a:lnR w="6350" cap="flat" cmpd="sng" algn="ctr">
-                      <a:solidFill>
-                        <a:schemeClr val="tx1"/>
-                      </a:solidFill>
-                      <a:prstDash val="solid"/>
-                      <a:round/>
-                      <a:headEnd type="none" w="med" len="med"/>
-                      <a:tailEnd type="none" w="med" len="med"/>
-                    </a:lnR>
-                    <a:lnT w="6350" cap="flat" cmpd="sng" algn="ctr">
-                      <a:solidFill>
-                        <a:schemeClr val="tx1"/>
-                      </a:solidFill>
-                      <a:prstDash val="solid"/>
-                      <a:round/>
-                      <a:headEnd type="none" w="med" len="med"/>
-                      <a:tailEnd type="none" w="med" len="med"/>
-                    </a:lnT>
-                    <a:lnB w="6350" cap="flat" cmpd="sng" algn="ctr">
-                      <a:solidFill>
-                        <a:schemeClr val="tx1"/>
-                      </a:solidFill>
-                      <a:prstDash val="solid"/>
-                      <a:round/>
-                      <a:headEnd type="none" w="med" len="med"/>
-                      <a:tailEnd type="none" w="med" len="med"/>
-                    </a:lnB>
-                  </a:tcPr>
+                  <a:tcPr anchor="ctr"/>
                 </a:tc>
                 <a:extLst>
                   <a:ext uri="{0D108BD9-81ED-4DB2-BD59-A6C34878D82A}">
@@ -21153,44 +21031,7 @@
                       </a:r>
                     </a:p>
                   </a:txBody>
-                  <a:tcPr anchor="ctr">
-                    <a:lnL w="6350" cap="flat" cmpd="sng" algn="ctr">
-                      <a:solidFill>
-                        <a:schemeClr val="tx1"/>
-                      </a:solidFill>
-                      <a:prstDash val="solid"/>
-                      <a:round/>
-                      <a:headEnd type="none" w="med" len="med"/>
-                      <a:tailEnd type="none" w="med" len="med"/>
-                    </a:lnL>
-                    <a:lnR w="6350" cap="flat" cmpd="sng" algn="ctr">
-                      <a:solidFill>
-                        <a:schemeClr val="tx1"/>
-                      </a:solidFill>
-                      <a:prstDash val="solid"/>
-                      <a:round/>
-                      <a:headEnd type="none" w="med" len="med"/>
-                      <a:tailEnd type="none" w="med" len="med"/>
-                    </a:lnR>
-                    <a:lnT w="6350" cap="flat" cmpd="sng" algn="ctr">
-                      <a:solidFill>
-                        <a:schemeClr val="tx1"/>
-                      </a:solidFill>
-                      <a:prstDash val="solid"/>
-                      <a:round/>
-                      <a:headEnd type="none" w="med" len="med"/>
-                      <a:tailEnd type="none" w="med" len="med"/>
-                    </a:lnT>
-                    <a:lnB w="6350" cap="flat" cmpd="sng" algn="ctr">
-                      <a:solidFill>
-                        <a:schemeClr val="tx1"/>
-                      </a:solidFill>
-                      <a:prstDash val="solid"/>
-                      <a:round/>
-                      <a:headEnd type="none" w="med" len="med"/>
-                      <a:tailEnd type="none" w="med" len="med"/>
-                    </a:lnB>
-                  </a:tcPr>
+                  <a:tcPr anchor="ctr"/>
                 </a:tc>
                 <a:tc>
                   <a:txBody>
@@ -21215,49 +21056,30 @@
                         </a:rPr>
                         <a:t>function</a:t>
                       </a:r>
+                      <a:r>
+                        <a:rPr lang="es-MX" sz="800" dirty="0">
+                          <a:effectLst/>
+                        </a:rPr>
+                        <a:t> </a:t>
+                      </a:r>
+                      <a:r>
+                        <a:rPr lang="es-MX" sz="800" dirty="0"/>
+                        <a:t>X</a:t>
+                      </a:r>
+                      <a:r>
+                        <a:rPr lang="el-GR" sz="800" dirty="0"/>
+                        <a:t>β = </a:t>
+                      </a:r>
+                      <a:r>
+                        <a:rPr lang="es-MX" sz="800" dirty="0"/>
+                        <a:t>E[Y ]</a:t>
+                      </a:r>
                       <a:endParaRPr lang="es-MX" sz="800" dirty="0">
                         <a:effectLst/>
                       </a:endParaRPr>
                     </a:p>
                   </a:txBody>
-                  <a:tcPr anchor="ctr">
-                    <a:lnL w="6350" cap="flat" cmpd="sng" algn="ctr">
-                      <a:solidFill>
-                        <a:schemeClr val="tx1"/>
-                      </a:solidFill>
-                      <a:prstDash val="solid"/>
-                      <a:round/>
-                      <a:headEnd type="none" w="med" len="med"/>
-                      <a:tailEnd type="none" w="med" len="med"/>
-                    </a:lnL>
-                    <a:lnR w="6350" cap="flat" cmpd="sng" algn="ctr">
-                      <a:solidFill>
-                        <a:schemeClr val="tx1"/>
-                      </a:solidFill>
-                      <a:prstDash val="solid"/>
-                      <a:round/>
-                      <a:headEnd type="none" w="med" len="med"/>
-                      <a:tailEnd type="none" w="med" len="med"/>
-                    </a:lnR>
-                    <a:lnT w="6350" cap="flat" cmpd="sng" algn="ctr">
-                      <a:solidFill>
-                        <a:schemeClr val="tx1"/>
-                      </a:solidFill>
-                      <a:prstDash val="solid"/>
-                      <a:round/>
-                      <a:headEnd type="none" w="med" len="med"/>
-                      <a:tailEnd type="none" w="med" len="med"/>
-                    </a:lnT>
-                    <a:lnB w="6350" cap="flat" cmpd="sng" algn="ctr">
-                      <a:solidFill>
-                        <a:schemeClr val="tx1"/>
-                      </a:solidFill>
-                      <a:prstDash val="solid"/>
-                      <a:round/>
-                      <a:headEnd type="none" w="med" len="med"/>
-                      <a:tailEnd type="none" w="med" len="med"/>
-                    </a:lnB>
-                  </a:tcPr>
+                  <a:tcPr anchor="ctr"/>
                 </a:tc>
                 <a:extLst>
                   <a:ext uri="{0D108BD9-81ED-4DB2-BD59-A6C34878D82A}">
@@ -21279,44 +21101,7 @@
                       </a:r>
                     </a:p>
                   </a:txBody>
-                  <a:tcPr anchor="ctr">
-                    <a:lnL w="6350" cap="flat" cmpd="sng" algn="ctr">
-                      <a:solidFill>
-                        <a:schemeClr val="tx1"/>
-                      </a:solidFill>
-                      <a:prstDash val="solid"/>
-                      <a:round/>
-                      <a:headEnd type="none" w="med" len="med"/>
-                      <a:tailEnd type="none" w="med" len="med"/>
-                    </a:lnL>
-                    <a:lnR w="6350" cap="flat" cmpd="sng" algn="ctr">
-                      <a:solidFill>
-                        <a:schemeClr val="tx1"/>
-                      </a:solidFill>
-                      <a:prstDash val="solid"/>
-                      <a:round/>
-                      <a:headEnd type="none" w="med" len="med"/>
-                      <a:tailEnd type="none" w="med" len="med"/>
-                    </a:lnR>
-                    <a:lnT w="6350" cap="flat" cmpd="sng" algn="ctr">
-                      <a:solidFill>
-                        <a:schemeClr val="tx1"/>
-                      </a:solidFill>
-                      <a:prstDash val="solid"/>
-                      <a:round/>
-                      <a:headEnd type="none" w="med" len="med"/>
-                      <a:tailEnd type="none" w="med" len="med"/>
-                    </a:lnT>
-                    <a:lnB w="6350" cap="flat" cmpd="sng" algn="ctr">
-                      <a:solidFill>
-                        <a:schemeClr val="tx1"/>
-                      </a:solidFill>
-                      <a:prstDash val="solid"/>
-                      <a:round/>
-                      <a:headEnd type="none" w="med" len="med"/>
-                      <a:tailEnd type="none" w="med" len="med"/>
-                    </a:lnB>
-                  </a:tcPr>
+                  <a:tcPr anchor="ctr"/>
                 </a:tc>
                 <a:tc>
                   <a:txBody>
@@ -21353,49 +21138,34 @@
                         </a:rPr>
                         <a:t>function</a:t>
                       </a:r>
+                      <a:r>
+                        <a:rPr lang="es-MX" sz="800" dirty="0">
+                          <a:effectLst/>
+                        </a:rPr>
+                        <a:t> </a:t>
+                      </a:r>
+                      <a:r>
+                        <a:rPr lang="es-MX" sz="800" dirty="0"/>
+                        <a:t>X</a:t>
+                      </a:r>
+                      <a:r>
+                        <a:rPr lang="el-GR" sz="800" dirty="0"/>
+                        <a:t>β = </a:t>
+                      </a:r>
+                      <a:r>
+                        <a:rPr lang="es-MX" sz="800" dirty="0" err="1"/>
+                        <a:t>ln</a:t>
+                      </a:r>
+                      <a:r>
+                        <a:rPr lang="es-MX" sz="800" dirty="0"/>
+                        <a:t> (P/ 1−P )</a:t>
+                      </a:r>
                       <a:endParaRPr lang="es-MX" sz="800" dirty="0">
                         <a:effectLst/>
                       </a:endParaRPr>
                     </a:p>
                   </a:txBody>
-                  <a:tcPr anchor="ctr">
-                    <a:lnL w="6350" cap="flat" cmpd="sng" algn="ctr">
-                      <a:solidFill>
-                        <a:schemeClr val="tx1"/>
-                      </a:solidFill>
-                      <a:prstDash val="solid"/>
-                      <a:round/>
-                      <a:headEnd type="none" w="med" len="med"/>
-                      <a:tailEnd type="none" w="med" len="med"/>
-                    </a:lnL>
-                    <a:lnR w="6350" cap="flat" cmpd="sng" algn="ctr">
-                      <a:solidFill>
-                        <a:schemeClr val="tx1"/>
-                      </a:solidFill>
-                      <a:prstDash val="solid"/>
-                      <a:round/>
-                      <a:headEnd type="none" w="med" len="med"/>
-                      <a:tailEnd type="none" w="med" len="med"/>
-                    </a:lnR>
-                    <a:lnT w="6350" cap="flat" cmpd="sng" algn="ctr">
-                      <a:solidFill>
-                        <a:schemeClr val="tx1"/>
-                      </a:solidFill>
-                      <a:prstDash val="solid"/>
-                      <a:round/>
-                      <a:headEnd type="none" w="med" len="med"/>
-                      <a:tailEnd type="none" w="med" len="med"/>
-                    </a:lnT>
-                    <a:lnB w="6350" cap="flat" cmpd="sng" algn="ctr">
-                      <a:solidFill>
-                        <a:schemeClr val="tx1"/>
-                      </a:solidFill>
-                      <a:prstDash val="solid"/>
-                      <a:round/>
-                      <a:headEnd type="none" w="med" len="med"/>
-                      <a:tailEnd type="none" w="med" len="med"/>
-                    </a:lnB>
-                  </a:tcPr>
+                  <a:tcPr anchor="ctr"/>
                 </a:tc>
                 <a:extLst>
                   <a:ext uri="{0D108BD9-81ED-4DB2-BD59-A6C34878D82A}">
@@ -21436,44 +21206,7 @@
                       </a:r>
                     </a:p>
                   </a:txBody>
-                  <a:tcPr anchor="ctr">
-                    <a:lnL w="6350" cap="flat" cmpd="sng" algn="ctr">
-                      <a:solidFill>
-                        <a:schemeClr val="tx1"/>
-                      </a:solidFill>
-                      <a:prstDash val="solid"/>
-                      <a:round/>
-                      <a:headEnd type="none" w="med" len="med"/>
-                      <a:tailEnd type="none" w="med" len="med"/>
-                    </a:lnL>
-                    <a:lnR w="6350" cap="flat" cmpd="sng" algn="ctr">
-                      <a:solidFill>
-                        <a:schemeClr val="tx1"/>
-                      </a:solidFill>
-                      <a:prstDash val="solid"/>
-                      <a:round/>
-                      <a:headEnd type="none" w="med" len="med"/>
-                      <a:tailEnd type="none" w="med" len="med"/>
-                    </a:lnR>
-                    <a:lnT w="6350" cap="flat" cmpd="sng" algn="ctr">
-                      <a:solidFill>
-                        <a:schemeClr val="tx1"/>
-                      </a:solidFill>
-                      <a:prstDash val="solid"/>
-                      <a:round/>
-                      <a:headEnd type="none" w="med" len="med"/>
-                      <a:tailEnd type="none" w="med" len="med"/>
-                    </a:lnT>
-                    <a:lnB w="6350" cap="flat" cmpd="sng" algn="ctr">
-                      <a:solidFill>
-                        <a:schemeClr val="tx1"/>
-                      </a:solidFill>
-                      <a:prstDash val="solid"/>
-                      <a:round/>
-                      <a:headEnd type="none" w="med" len="med"/>
-                      <a:tailEnd type="none" w="med" len="med"/>
-                    </a:lnB>
-                  </a:tcPr>
+                  <a:tcPr anchor="ctr"/>
                 </a:tc>
                 <a:tc>
                   <a:txBody>
@@ -21496,48 +21229,30 @@
                         <a:rPr lang="es-MX" sz="800" dirty="0">
                           <a:effectLst/>
                         </a:rPr>
-                        <a:t> (aka log-linear)</a:t>
+                        <a:t> </a:t>
                       </a:r>
+                      <a:r>
+                        <a:rPr lang="es-MX" sz="800" dirty="0"/>
+                        <a:t>X</a:t>
+                      </a:r>
+                      <a:r>
+                        <a:rPr lang="el-GR" sz="800" dirty="0"/>
+                        <a:t>β = </a:t>
+                      </a:r>
+                      <a:r>
+                        <a:rPr lang="es-MX" sz="800" dirty="0" err="1"/>
+                        <a:t>ln</a:t>
+                      </a:r>
+                      <a:r>
+                        <a:rPr lang="es-MX" sz="800" dirty="0"/>
+                        <a:t>(E[Y ])</a:t>
+                      </a:r>
+                      <a:endParaRPr lang="es-MX" sz="800" dirty="0">
+                        <a:effectLst/>
+                      </a:endParaRPr>
                     </a:p>
                   </a:txBody>
-                  <a:tcPr anchor="ctr">
-                    <a:lnL w="6350" cap="flat" cmpd="sng" algn="ctr">
-                      <a:solidFill>
-                        <a:schemeClr val="tx1"/>
-                      </a:solidFill>
-                      <a:prstDash val="solid"/>
-                      <a:round/>
-                      <a:headEnd type="none" w="med" len="med"/>
-                      <a:tailEnd type="none" w="med" len="med"/>
-                    </a:lnL>
-                    <a:lnR w="6350" cap="flat" cmpd="sng" algn="ctr">
-                      <a:solidFill>
-                        <a:schemeClr val="tx1"/>
-                      </a:solidFill>
-                      <a:prstDash val="solid"/>
-                      <a:round/>
-                      <a:headEnd type="none" w="med" len="med"/>
-                      <a:tailEnd type="none" w="med" len="med"/>
-                    </a:lnR>
-                    <a:lnT w="6350" cap="flat" cmpd="sng" algn="ctr">
-                      <a:solidFill>
-                        <a:schemeClr val="tx1"/>
-                      </a:solidFill>
-                      <a:prstDash val="solid"/>
-                      <a:round/>
-                      <a:headEnd type="none" w="med" len="med"/>
-                      <a:tailEnd type="none" w="med" len="med"/>
-                    </a:lnT>
-                    <a:lnB w="6350" cap="flat" cmpd="sng" algn="ctr">
-                      <a:solidFill>
-                        <a:schemeClr val="tx1"/>
-                      </a:solidFill>
-                      <a:prstDash val="solid"/>
-                      <a:round/>
-                      <a:headEnd type="none" w="med" len="med"/>
-                      <a:tailEnd type="none" w="med" len="med"/>
-                    </a:lnB>
-                  </a:tcPr>
+                  <a:tcPr anchor="ctr"/>
                 </a:tc>
                 <a:extLst>
                   <a:ext uri="{0D108BD9-81ED-4DB2-BD59-A6C34878D82A}">

</xml_diff>